<commit_message>
Here are the slides and a random pracitce file for testing purposes
</commit_message>
<xml_diff>
--- a/slides_ppt.pptx
+++ b/slides_ppt.pptx
@@ -5,13 +5,20 @@
     <p:sldMasterId id="2147483648" r:id="rId1"/>
   </p:sldMasterIdLst>
   <p:sldIdLst>
-    <p:sldId id="259" r:id="rId2"/>
-    <p:sldId id="256" r:id="rId3"/>
-    <p:sldId id="257" r:id="rId4"/>
-    <p:sldId id="262" r:id="rId5"/>
-    <p:sldId id="260" r:id="rId6"/>
-    <p:sldId id="258" r:id="rId7"/>
+    <p:sldId id="256" r:id="rId2"/>
+    <p:sldId id="257" r:id="rId3"/>
+    <p:sldId id="262" r:id="rId4"/>
+    <p:sldId id="260" r:id="rId5"/>
+    <p:sldId id="258" r:id="rId6"/>
+    <p:sldId id="265" r:id="rId7"/>
     <p:sldId id="261" r:id="rId8"/>
+    <p:sldId id="263" r:id="rId9"/>
+    <p:sldId id="267" r:id="rId10"/>
+    <p:sldId id="264" r:id="rId11"/>
+    <p:sldId id="268" r:id="rId12"/>
+    <p:sldId id="266" r:id="rId13"/>
+    <p:sldId id="269" r:id="rId14"/>
+    <p:sldId id="270" r:id="rId15"/>
   </p:sldIdLst>
   <p:sldSz cx="12192000" cy="6858000"/>
   <p:notesSz cx="6858000" cy="9144000"/>
@@ -3332,15 +3339,15 @@
           <p:cNvPr id="2" name="Title 1">
             <a:extLst>
               <a:ext uri="{FF2B5EF4-FFF2-40B4-BE49-F238E27FC236}">
-                <a16:creationId xmlns:a16="http://schemas.microsoft.com/office/drawing/2014/main" id="{21228C5E-7A32-6B48-AC6C-F5F186FB9E81}"/>
-              </a:ext>
-            </a:extLst>
-          </p:cNvPr>
-          <p:cNvSpPr>
-            <a:spLocks noGrp="1"/>
-          </p:cNvSpPr>
-          <p:nvPr>
-            <p:ph type="title"/>
+                <a16:creationId xmlns:a16="http://schemas.microsoft.com/office/drawing/2014/main" id="{99CC93E7-EBAD-ED44-BC94-E3E12A60F34F}"/>
+              </a:ext>
+            </a:extLst>
+          </p:cNvPr>
+          <p:cNvSpPr>
+            <a:spLocks noGrp="1"/>
+          </p:cNvSpPr>
+          <p:nvPr>
+            <p:ph type="ctrTitle"/>
           </p:nvPr>
         </p:nvSpPr>
         <p:spPr/>
@@ -3348,24 +3355,27 @@
           <a:bodyPr/>
           <a:lstStyle/>
           <a:p>
-            <a:endParaRPr lang="en-US" dirty="0"/>
-          </a:p>
-        </p:txBody>
-      </p:sp>
-      <p:sp>
-        <p:nvSpPr>
-          <p:cNvPr id="3" name="Content Placeholder 2">
-            <a:extLst>
-              <a:ext uri="{FF2B5EF4-FFF2-40B4-BE49-F238E27FC236}">
-                <a16:creationId xmlns:a16="http://schemas.microsoft.com/office/drawing/2014/main" id="{7583A33C-1139-D746-98DE-7FB6A1C6E1EF}"/>
-              </a:ext>
-            </a:extLst>
-          </p:cNvPr>
-          <p:cNvSpPr>
-            <a:spLocks noGrp="1"/>
-          </p:cNvSpPr>
-          <p:nvPr>
-            <p:ph idx="1"/>
+            <a:r>
+              <a:rPr lang="en-US" dirty="0"/>
+              <a:t>Intro to Git/GitHub</a:t>
+            </a:r>
+          </a:p>
+        </p:txBody>
+      </p:sp>
+      <p:sp>
+        <p:nvSpPr>
+          <p:cNvPr id="3" name="Subtitle 2">
+            <a:extLst>
+              <a:ext uri="{FF2B5EF4-FFF2-40B4-BE49-F238E27FC236}">
+                <a16:creationId xmlns:a16="http://schemas.microsoft.com/office/drawing/2014/main" id="{1A5B2985-11F8-C14B-9D4E-578C0C225204}"/>
+              </a:ext>
+            </a:extLst>
+          </p:cNvPr>
+          <p:cNvSpPr>
+            <a:spLocks noGrp="1"/>
+          </p:cNvSpPr>
+          <p:nvPr>
+            <p:ph type="subTitle" idx="1"/>
           </p:nvPr>
         </p:nvSpPr>
         <p:spPr/>
@@ -3373,14 +3383,602 @@
           <a:bodyPr/>
           <a:lstStyle/>
           <a:p>
-            <a:endParaRPr lang="en-US"/>
+            <a:r>
+              <a:rPr lang="en-US" dirty="0"/>
+              <a:t>By Nate Kurt</a:t>
+            </a:r>
           </a:p>
         </p:txBody>
       </p:sp>
     </p:spTree>
     <p:extLst>
       <p:ext uri="{BB962C8B-B14F-4D97-AF65-F5344CB8AC3E}">
-        <p14:creationId xmlns:p14="http://schemas.microsoft.com/office/powerpoint/2010/main" val="3341114110"/>
+        <p14:creationId xmlns:p14="http://schemas.microsoft.com/office/powerpoint/2010/main" val="3234205232"/>
+      </p:ext>
+    </p:extLst>
+  </p:cSld>
+  <p:clrMapOvr>
+    <a:masterClrMapping/>
+  </p:clrMapOvr>
+</p:sld>
+</file>
+
+<file path=ppt/slides/slide10.xml><?xml version="1.0" encoding="utf-8"?>
+<p:sld xmlns:a="http://schemas.openxmlformats.org/drawingml/2006/main" xmlns:r="http://schemas.openxmlformats.org/officeDocument/2006/relationships" xmlns:p="http://schemas.openxmlformats.org/presentationml/2006/main">
+  <p:cSld>
+    <p:spTree>
+      <p:nvGrpSpPr>
+        <p:cNvPr id="1" name=""/>
+        <p:cNvGrpSpPr/>
+        <p:nvPr/>
+      </p:nvGrpSpPr>
+      <p:grpSpPr>
+        <a:xfrm>
+          <a:off x="0" y="0"/>
+          <a:ext cx="0" cy="0"/>
+          <a:chOff x="0" y="0"/>
+          <a:chExt cx="0" cy="0"/>
+        </a:xfrm>
+      </p:grpSpPr>
+      <p:sp>
+        <p:nvSpPr>
+          <p:cNvPr id="2" name="Title 1">
+            <a:extLst>
+              <a:ext uri="{FF2B5EF4-FFF2-40B4-BE49-F238E27FC236}">
+                <a16:creationId xmlns:a16="http://schemas.microsoft.com/office/drawing/2014/main" id="{EF1FF3DE-15E2-CB42-88FF-5C2EC38A663B}"/>
+              </a:ext>
+            </a:extLst>
+          </p:cNvPr>
+          <p:cNvSpPr>
+            <a:spLocks noGrp="1"/>
+          </p:cNvSpPr>
+          <p:nvPr>
+            <p:ph type="title"/>
+          </p:nvPr>
+        </p:nvSpPr>
+        <p:spPr/>
+        <p:txBody>
+          <a:bodyPr/>
+          <a:lstStyle/>
+          <a:p>
+            <a:r>
+              <a:rPr lang="en-US" dirty="0"/>
+              <a:t>So Why Git?</a:t>
+            </a:r>
+          </a:p>
+        </p:txBody>
+      </p:sp>
+      <p:sp>
+        <p:nvSpPr>
+          <p:cNvPr id="3" name="Content Placeholder 2">
+            <a:extLst>
+              <a:ext uri="{FF2B5EF4-FFF2-40B4-BE49-F238E27FC236}">
+                <a16:creationId xmlns:a16="http://schemas.microsoft.com/office/drawing/2014/main" id="{3778ECCD-6A6F-CC42-A75C-B14F6F779A4C}"/>
+              </a:ext>
+            </a:extLst>
+          </p:cNvPr>
+          <p:cNvSpPr>
+            <a:spLocks noGrp="1"/>
+          </p:cNvSpPr>
+          <p:nvPr>
+            <p:ph idx="1"/>
+          </p:nvPr>
+        </p:nvSpPr>
+        <p:spPr/>
+        <p:txBody>
+          <a:bodyPr/>
+          <a:lstStyle/>
+          <a:p>
+            <a:r>
+              <a:rPr lang="en-US" sz="4800" dirty="0"/>
+              <a:t>NO MORE FLASHDRIVES!!</a:t>
+            </a:r>
+          </a:p>
+          <a:p>
+            <a:r>
+              <a:rPr lang="en-US" sz="4800" dirty="0"/>
+              <a:t>Collaboration is easy! </a:t>
+            </a:r>
+          </a:p>
+          <a:p>
+            <a:r>
+              <a:rPr lang="en-US" sz="4800" dirty="0"/>
+              <a:t>It’s the most popular tool in the industry right now</a:t>
+            </a:r>
+          </a:p>
+          <a:p>
+            <a:endParaRPr lang="en-US" dirty="0"/>
+          </a:p>
+          <a:p>
+            <a:endParaRPr lang="en-US" dirty="0"/>
+          </a:p>
+          <a:p>
+            <a:endParaRPr lang="en-US" dirty="0"/>
+          </a:p>
+        </p:txBody>
+      </p:sp>
+    </p:spTree>
+    <p:extLst>
+      <p:ext uri="{BB962C8B-B14F-4D97-AF65-F5344CB8AC3E}">
+        <p14:creationId xmlns:p14="http://schemas.microsoft.com/office/powerpoint/2010/main" val="4274842972"/>
+      </p:ext>
+    </p:extLst>
+  </p:cSld>
+  <p:clrMapOvr>
+    <a:masterClrMapping/>
+  </p:clrMapOvr>
+</p:sld>
+</file>
+
+<file path=ppt/slides/slide11.xml><?xml version="1.0" encoding="utf-8"?>
+<p:sld xmlns:a="http://schemas.openxmlformats.org/drawingml/2006/main" xmlns:r="http://schemas.openxmlformats.org/officeDocument/2006/relationships" xmlns:p="http://schemas.openxmlformats.org/presentationml/2006/main">
+  <p:cSld>
+    <p:spTree>
+      <p:nvGrpSpPr>
+        <p:cNvPr id="1" name=""/>
+        <p:cNvGrpSpPr/>
+        <p:nvPr/>
+      </p:nvGrpSpPr>
+      <p:grpSpPr>
+        <a:xfrm>
+          <a:off x="0" y="0"/>
+          <a:ext cx="0" cy="0"/>
+          <a:chOff x="0" y="0"/>
+          <a:chExt cx="0" cy="0"/>
+        </a:xfrm>
+      </p:grpSpPr>
+      <p:sp>
+        <p:nvSpPr>
+          <p:cNvPr id="6" name="Title 1">
+            <a:extLst>
+              <a:ext uri="{FF2B5EF4-FFF2-40B4-BE49-F238E27FC236}">
+                <a16:creationId xmlns:a16="http://schemas.microsoft.com/office/drawing/2014/main" id="{67FA47FA-C0F7-B542-BF1C-3B08014DCC0B}"/>
+              </a:ext>
+            </a:extLst>
+          </p:cNvPr>
+          <p:cNvSpPr txBox="1">
+            <a:spLocks/>
+          </p:cNvSpPr>
+          <p:nvPr/>
+        </p:nvSpPr>
+        <p:spPr>
+          <a:xfrm>
+            <a:off x="0" y="2208212"/>
+            <a:ext cx="12192000" cy="2387600"/>
+          </a:xfrm>
+          <a:prstGeom prst="rect">
+            <a:avLst/>
+          </a:prstGeom>
+        </p:spPr>
+        <p:txBody>
+          <a:bodyPr vert="horz" lIns="91440" tIns="45720" rIns="91440" bIns="45720" rtlCol="0" anchor="ctr">
+            <a:normAutofit fontScale="92500" lnSpcReduction="10000"/>
+          </a:bodyPr>
+          <a:lstStyle>
+            <a:lvl1pPr algn="l" defTabSz="914400" rtl="0" eaLnBrk="1" latinLnBrk="0" hangingPunct="1">
+              <a:lnSpc>
+                <a:spcPct val="90000"/>
+              </a:lnSpc>
+              <a:spcBef>
+                <a:spcPct val="0"/>
+              </a:spcBef>
+              <a:buNone/>
+              <a:defRPr sz="4400" kern="1200">
+                <a:solidFill>
+                  <a:schemeClr val="tx1"/>
+                </a:solidFill>
+                <a:latin typeface="+mj-lt"/>
+                <a:ea typeface="+mj-ea"/>
+                <a:cs typeface="+mj-cs"/>
+              </a:defRPr>
+            </a:lvl1pPr>
+          </a:lstStyle>
+          <a:p>
+            <a:pPr algn="ctr"/>
+            <a:r>
+              <a:rPr lang="en-US" sz="9600" dirty="0"/>
+              <a:t>Installing Git</a:t>
+            </a:r>
+          </a:p>
+          <a:p>
+            <a:pPr algn="ctr"/>
+            <a:r>
+              <a:rPr lang="en-US" sz="9600" dirty="0"/>
+              <a:t>(For Real This Time) </a:t>
+            </a:r>
+          </a:p>
+        </p:txBody>
+      </p:sp>
+    </p:spTree>
+    <p:extLst>
+      <p:ext uri="{BB962C8B-B14F-4D97-AF65-F5344CB8AC3E}">
+        <p14:creationId xmlns:p14="http://schemas.microsoft.com/office/powerpoint/2010/main" val="818626991"/>
+      </p:ext>
+    </p:extLst>
+  </p:cSld>
+  <p:clrMapOvr>
+    <a:masterClrMapping/>
+  </p:clrMapOvr>
+</p:sld>
+</file>
+
+<file path=ppt/slides/slide12.xml><?xml version="1.0" encoding="utf-8"?>
+<p:sld xmlns:a="http://schemas.openxmlformats.org/drawingml/2006/main" xmlns:r="http://schemas.openxmlformats.org/officeDocument/2006/relationships" xmlns:p="http://schemas.openxmlformats.org/presentationml/2006/main">
+  <p:cSld>
+    <p:spTree>
+      <p:nvGrpSpPr>
+        <p:cNvPr id="1" name=""/>
+        <p:cNvGrpSpPr/>
+        <p:nvPr/>
+      </p:nvGrpSpPr>
+      <p:grpSpPr>
+        <a:xfrm>
+          <a:off x="0" y="0"/>
+          <a:ext cx="0" cy="0"/>
+          <a:chOff x="0" y="0"/>
+          <a:chExt cx="0" cy="0"/>
+        </a:xfrm>
+      </p:grpSpPr>
+      <p:sp>
+        <p:nvSpPr>
+          <p:cNvPr id="2" name="Title 1">
+            <a:extLst>
+              <a:ext uri="{FF2B5EF4-FFF2-40B4-BE49-F238E27FC236}">
+                <a16:creationId xmlns:a16="http://schemas.microsoft.com/office/drawing/2014/main" id="{17EE4AC6-9637-5347-B836-895DA7DFB7B2}"/>
+              </a:ext>
+            </a:extLst>
+          </p:cNvPr>
+          <p:cNvSpPr>
+            <a:spLocks noGrp="1"/>
+          </p:cNvSpPr>
+          <p:nvPr>
+            <p:ph type="title"/>
+          </p:nvPr>
+        </p:nvSpPr>
+        <p:spPr>
+          <a:xfrm>
+            <a:off x="838200" y="365125"/>
+            <a:ext cx="10515600" cy="1838324"/>
+          </a:xfrm>
+        </p:spPr>
+        <p:txBody>
+          <a:bodyPr>
+            <a:noAutofit/>
+          </a:bodyPr>
+          <a:lstStyle/>
+          <a:p>
+            <a:r>
+              <a:rPr lang="en-US" sz="4000" dirty="0"/>
+              <a:t>Windows: </a:t>
+            </a:r>
+            <a:br>
+              <a:rPr lang="en-US" sz="4000" dirty="0"/>
+            </a:br>
+            <a:r>
+              <a:rPr lang="en-US" sz="4000" dirty="0"/>
+              <a:t>Download git-bash(</a:t>
+            </a:r>
+            <a:r>
+              <a:rPr lang="en-US" sz="4000" dirty="0">
+                <a:hlinkClick r:id="rId2"/>
+              </a:rPr>
+              <a:t>https://gitforwindows.org/</a:t>
+            </a:r>
+            <a:r>
+              <a:rPr lang="en-US" sz="4000" dirty="0"/>
+              <a:t>)</a:t>
+            </a:r>
+            <a:br>
+              <a:rPr lang="en-US" sz="4000" dirty="0"/>
+            </a:br>
+            <a:r>
+              <a:rPr lang="en-US" sz="4000" dirty="0"/>
+              <a:t>	</a:t>
+            </a:r>
+          </a:p>
+        </p:txBody>
+      </p:sp>
+      <p:sp>
+        <p:nvSpPr>
+          <p:cNvPr id="4" name="Title 1">
+            <a:extLst>
+              <a:ext uri="{FF2B5EF4-FFF2-40B4-BE49-F238E27FC236}">
+                <a16:creationId xmlns:a16="http://schemas.microsoft.com/office/drawing/2014/main" id="{9EDDEF9B-85C9-0540-8E26-DC1DF2F05DBC}"/>
+              </a:ext>
+            </a:extLst>
+          </p:cNvPr>
+          <p:cNvSpPr txBox="1">
+            <a:spLocks/>
+          </p:cNvSpPr>
+          <p:nvPr/>
+        </p:nvSpPr>
+        <p:spPr>
+          <a:xfrm>
+            <a:off x="838200" y="2078036"/>
+            <a:ext cx="10515600" cy="2497139"/>
+          </a:xfrm>
+          <a:prstGeom prst="rect">
+            <a:avLst/>
+          </a:prstGeom>
+        </p:spPr>
+        <p:txBody>
+          <a:bodyPr vert="horz" lIns="91440" tIns="45720" rIns="91440" bIns="45720" rtlCol="0" anchor="ctr">
+            <a:normAutofit/>
+          </a:bodyPr>
+          <a:lstStyle>
+            <a:lvl1pPr algn="l" defTabSz="914400" rtl="0" eaLnBrk="1" latinLnBrk="0" hangingPunct="1">
+              <a:lnSpc>
+                <a:spcPct val="90000"/>
+              </a:lnSpc>
+              <a:spcBef>
+                <a:spcPct val="0"/>
+              </a:spcBef>
+              <a:buNone/>
+              <a:defRPr sz="4400" kern="1200">
+                <a:solidFill>
+                  <a:schemeClr val="tx1"/>
+                </a:solidFill>
+                <a:latin typeface="+mj-lt"/>
+                <a:ea typeface="+mj-ea"/>
+                <a:cs typeface="+mj-cs"/>
+              </a:defRPr>
+            </a:lvl1pPr>
+          </a:lstStyle>
+          <a:p>
+            <a:r>
+              <a:rPr lang="en-US" sz="4000" dirty="0"/>
+              <a:t>Mac:</a:t>
+            </a:r>
+          </a:p>
+          <a:p>
+            <a:r>
+              <a:rPr lang="en-US" sz="4000" dirty="0"/>
+              <a:t>“brew install git” in terminal</a:t>
+            </a:r>
+          </a:p>
+          <a:p>
+            <a:endParaRPr lang="en-US" sz="4000" dirty="0"/>
+          </a:p>
+        </p:txBody>
+      </p:sp>
+      <p:sp>
+        <p:nvSpPr>
+          <p:cNvPr id="5" name="Title 1">
+            <a:extLst>
+              <a:ext uri="{FF2B5EF4-FFF2-40B4-BE49-F238E27FC236}">
+                <a16:creationId xmlns:a16="http://schemas.microsoft.com/office/drawing/2014/main" id="{11A951DC-4FCF-4B49-951D-157A818DD49C}"/>
+              </a:ext>
+            </a:extLst>
+          </p:cNvPr>
+          <p:cNvSpPr txBox="1">
+            <a:spLocks/>
+          </p:cNvSpPr>
+          <p:nvPr/>
+        </p:nvSpPr>
+        <p:spPr>
+          <a:xfrm>
+            <a:off x="838200" y="4575175"/>
+            <a:ext cx="10515600" cy="1325563"/>
+          </a:xfrm>
+          <a:prstGeom prst="rect">
+            <a:avLst/>
+          </a:prstGeom>
+        </p:spPr>
+        <p:txBody>
+          <a:bodyPr vert="horz" lIns="91440" tIns="45720" rIns="91440" bIns="45720" rtlCol="0" anchor="ctr">
+            <a:noAutofit/>
+          </a:bodyPr>
+          <a:lstStyle>
+            <a:lvl1pPr algn="l" defTabSz="914400" rtl="0" eaLnBrk="1" latinLnBrk="0" hangingPunct="1">
+              <a:lnSpc>
+                <a:spcPct val="90000"/>
+              </a:lnSpc>
+              <a:spcBef>
+                <a:spcPct val="0"/>
+              </a:spcBef>
+              <a:buNone/>
+              <a:defRPr sz="4400" kern="1200">
+                <a:solidFill>
+                  <a:schemeClr val="tx1"/>
+                </a:solidFill>
+                <a:latin typeface="+mj-lt"/>
+                <a:ea typeface="+mj-ea"/>
+                <a:cs typeface="+mj-cs"/>
+              </a:defRPr>
+            </a:lvl1pPr>
+          </a:lstStyle>
+          <a:p>
+            <a:r>
+              <a:rPr lang="en-US" sz="4000" dirty="0"/>
+              <a:t>Linux:</a:t>
+            </a:r>
+          </a:p>
+          <a:p>
+            <a:r>
+              <a:rPr lang="en-US" sz="4000" dirty="0"/>
+              <a:t>“</a:t>
+            </a:r>
+            <a:r>
+              <a:rPr lang="en-US" sz="4000" dirty="0" err="1"/>
+              <a:t>sudo</a:t>
+            </a:r>
+            <a:r>
+              <a:rPr lang="en-US" sz="4000" dirty="0"/>
+              <a:t> apt install git” in terminal</a:t>
+            </a:r>
+          </a:p>
+          <a:p>
+            <a:r>
+              <a:rPr lang="en-US" sz="4000" dirty="0"/>
+              <a:t> </a:t>
+            </a:r>
+          </a:p>
+        </p:txBody>
+      </p:sp>
+    </p:spTree>
+    <p:extLst>
+      <p:ext uri="{BB962C8B-B14F-4D97-AF65-F5344CB8AC3E}">
+        <p14:creationId xmlns:p14="http://schemas.microsoft.com/office/powerpoint/2010/main" val="2839398170"/>
+      </p:ext>
+    </p:extLst>
+  </p:cSld>
+  <p:clrMapOvr>
+    <a:masterClrMapping/>
+  </p:clrMapOvr>
+</p:sld>
+</file>
+
+<file path=ppt/slides/slide13.xml><?xml version="1.0" encoding="utf-8"?>
+<p:sld xmlns:a="http://schemas.openxmlformats.org/drawingml/2006/main" xmlns:r="http://schemas.openxmlformats.org/officeDocument/2006/relationships" xmlns:p="http://schemas.openxmlformats.org/presentationml/2006/main">
+  <p:cSld>
+    <p:spTree>
+      <p:nvGrpSpPr>
+        <p:cNvPr id="1" name=""/>
+        <p:cNvGrpSpPr/>
+        <p:nvPr/>
+      </p:nvGrpSpPr>
+      <p:grpSpPr>
+        <a:xfrm>
+          <a:off x="0" y="0"/>
+          <a:ext cx="0" cy="0"/>
+          <a:chOff x="0" y="0"/>
+          <a:chExt cx="0" cy="0"/>
+        </a:xfrm>
+      </p:grpSpPr>
+      <p:sp>
+        <p:nvSpPr>
+          <p:cNvPr id="2" name="Title 1">
+            <a:extLst>
+              <a:ext uri="{FF2B5EF4-FFF2-40B4-BE49-F238E27FC236}">
+                <a16:creationId xmlns:a16="http://schemas.microsoft.com/office/drawing/2014/main" id="{E307D866-2A8E-1F44-A514-23D9169A07A2}"/>
+              </a:ext>
+            </a:extLst>
+          </p:cNvPr>
+          <p:cNvSpPr>
+            <a:spLocks noGrp="1"/>
+          </p:cNvSpPr>
+          <p:nvPr>
+            <p:ph type="title"/>
+          </p:nvPr>
+        </p:nvSpPr>
+        <p:spPr/>
+        <p:txBody>
+          <a:bodyPr/>
+          <a:lstStyle/>
+          <a:p>
+            <a:endParaRPr lang="en-US" dirty="0"/>
+          </a:p>
+        </p:txBody>
+      </p:sp>
+      <p:sp>
+        <p:nvSpPr>
+          <p:cNvPr id="3" name="Content Placeholder 2">
+            <a:extLst>
+              <a:ext uri="{FF2B5EF4-FFF2-40B4-BE49-F238E27FC236}">
+                <a16:creationId xmlns:a16="http://schemas.microsoft.com/office/drawing/2014/main" id="{B71725CF-17C2-1A44-8762-192090EC3A1F}"/>
+              </a:ext>
+            </a:extLst>
+          </p:cNvPr>
+          <p:cNvSpPr>
+            <a:spLocks noGrp="1"/>
+          </p:cNvSpPr>
+          <p:nvPr>
+            <p:ph idx="1"/>
+          </p:nvPr>
+        </p:nvSpPr>
+        <p:spPr/>
+        <p:txBody>
+          <a:bodyPr/>
+          <a:lstStyle/>
+          <a:p>
+            <a:endParaRPr lang="en-US"/>
+          </a:p>
+        </p:txBody>
+      </p:sp>
+    </p:spTree>
+    <p:extLst>
+      <p:ext uri="{BB962C8B-B14F-4D97-AF65-F5344CB8AC3E}">
+        <p14:creationId xmlns:p14="http://schemas.microsoft.com/office/powerpoint/2010/main" val="4082988274"/>
+      </p:ext>
+    </p:extLst>
+  </p:cSld>
+  <p:clrMapOvr>
+    <a:masterClrMapping/>
+  </p:clrMapOvr>
+</p:sld>
+</file>
+
+<file path=ppt/slides/slide14.xml><?xml version="1.0" encoding="utf-8"?>
+<p:sld xmlns:a="http://schemas.openxmlformats.org/drawingml/2006/main" xmlns:r="http://schemas.openxmlformats.org/officeDocument/2006/relationships" xmlns:p="http://schemas.openxmlformats.org/presentationml/2006/main">
+  <p:cSld>
+    <p:spTree>
+      <p:nvGrpSpPr>
+        <p:cNvPr id="1" name=""/>
+        <p:cNvGrpSpPr/>
+        <p:nvPr/>
+      </p:nvGrpSpPr>
+      <p:grpSpPr>
+        <a:xfrm>
+          <a:off x="0" y="0"/>
+          <a:ext cx="0" cy="0"/>
+          <a:chOff x="0" y="0"/>
+          <a:chExt cx="0" cy="0"/>
+        </a:xfrm>
+      </p:grpSpPr>
+      <p:sp>
+        <p:nvSpPr>
+          <p:cNvPr id="2" name="Title 1">
+            <a:extLst>
+              <a:ext uri="{FF2B5EF4-FFF2-40B4-BE49-F238E27FC236}">
+                <a16:creationId xmlns:a16="http://schemas.microsoft.com/office/drawing/2014/main" id="{5E9C97D5-150A-7442-92C7-E5AE7D47FCC4}"/>
+              </a:ext>
+            </a:extLst>
+          </p:cNvPr>
+          <p:cNvSpPr>
+            <a:spLocks noGrp="1"/>
+          </p:cNvSpPr>
+          <p:nvPr>
+            <p:ph type="title"/>
+          </p:nvPr>
+        </p:nvSpPr>
+        <p:spPr/>
+        <p:txBody>
+          <a:bodyPr/>
+          <a:lstStyle/>
+          <a:p>
+            <a:endParaRPr lang="en-US" dirty="0"/>
+          </a:p>
+        </p:txBody>
+      </p:sp>
+      <p:sp>
+        <p:nvSpPr>
+          <p:cNvPr id="3" name="Content Placeholder 2">
+            <a:extLst>
+              <a:ext uri="{FF2B5EF4-FFF2-40B4-BE49-F238E27FC236}">
+                <a16:creationId xmlns:a16="http://schemas.microsoft.com/office/drawing/2014/main" id="{F03289EB-5DF4-9140-9B34-8AE576F4F553}"/>
+              </a:ext>
+            </a:extLst>
+          </p:cNvPr>
+          <p:cNvSpPr>
+            <a:spLocks noGrp="1"/>
+          </p:cNvSpPr>
+          <p:nvPr>
+            <p:ph idx="1"/>
+          </p:nvPr>
+        </p:nvSpPr>
+        <p:spPr/>
+        <p:txBody>
+          <a:bodyPr/>
+          <a:lstStyle/>
+          <a:p>
+            <a:endParaRPr lang="en-US"/>
+          </a:p>
+        </p:txBody>
+      </p:sp>
+    </p:spTree>
+    <p:extLst>
+      <p:ext uri="{BB962C8B-B14F-4D97-AF65-F5344CB8AC3E}">
+        <p14:creationId xmlns:p14="http://schemas.microsoft.com/office/powerpoint/2010/main" val="2336429784"/>
       </p:ext>
     </p:extLst>
   </p:cSld>
@@ -3412,15 +4010,50 @@
           <p:cNvPr id="2" name="Title 1">
             <a:extLst>
               <a:ext uri="{FF2B5EF4-FFF2-40B4-BE49-F238E27FC236}">
-                <a16:creationId xmlns:a16="http://schemas.microsoft.com/office/drawing/2014/main" id="{99CC93E7-EBAD-ED44-BC94-E3E12A60F34F}"/>
-              </a:ext>
-            </a:extLst>
-          </p:cNvPr>
-          <p:cNvSpPr>
-            <a:spLocks noGrp="1"/>
-          </p:cNvSpPr>
-          <p:nvPr>
-            <p:ph type="ctrTitle"/>
+                <a16:creationId xmlns:a16="http://schemas.microsoft.com/office/drawing/2014/main" id="{AB61CC62-9637-824B-A68A-F25951FCCD43}"/>
+              </a:ext>
+            </a:extLst>
+          </p:cNvPr>
+          <p:cNvSpPr>
+            <a:spLocks noGrp="1"/>
+          </p:cNvSpPr>
+          <p:nvPr>
+            <p:ph type="title"/>
+          </p:nvPr>
+        </p:nvSpPr>
+        <p:spPr>
+          <a:xfrm>
+            <a:off x="305763" y="341976"/>
+            <a:ext cx="11697183" cy="1325563"/>
+          </a:xfrm>
+        </p:spPr>
+        <p:txBody>
+          <a:bodyPr>
+            <a:normAutofit/>
+          </a:bodyPr>
+          <a:lstStyle/>
+          <a:p>
+            <a:r>
+              <a:rPr lang="en-US" dirty="0"/>
+              <a:t>By the end of this workshop, you should be able to:</a:t>
+            </a:r>
+          </a:p>
+        </p:txBody>
+      </p:sp>
+      <p:sp>
+        <p:nvSpPr>
+          <p:cNvPr id="3" name="Content Placeholder 2">
+            <a:extLst>
+              <a:ext uri="{FF2B5EF4-FFF2-40B4-BE49-F238E27FC236}">
+                <a16:creationId xmlns:a16="http://schemas.microsoft.com/office/drawing/2014/main" id="{CAF7219D-B1AA-2B43-9DCB-1789182DC909}"/>
+              </a:ext>
+            </a:extLst>
+          </p:cNvPr>
+          <p:cNvSpPr>
+            <a:spLocks noGrp="1"/>
+          </p:cNvSpPr>
+          <p:nvPr>
+            <p:ph idx="1"/>
           </p:nvPr>
         </p:nvSpPr>
         <p:spPr/>
@@ -3430,49 +4063,491 @@
           <a:p>
             <a:r>
               <a:rPr lang="en-US" dirty="0"/>
-              <a:t>Intro to Git/GitHub</a:t>
-            </a:r>
-          </a:p>
-        </p:txBody>
-      </p:sp>
-      <p:sp>
-        <p:nvSpPr>
-          <p:cNvPr id="3" name="Subtitle 2">
-            <a:extLst>
-              <a:ext uri="{FF2B5EF4-FFF2-40B4-BE49-F238E27FC236}">
-                <a16:creationId xmlns:a16="http://schemas.microsoft.com/office/drawing/2014/main" id="{1A5B2985-11F8-C14B-9D4E-578C0C225204}"/>
-              </a:ext>
-            </a:extLst>
-          </p:cNvPr>
-          <p:cNvSpPr>
-            <a:spLocks noGrp="1"/>
-          </p:cNvSpPr>
-          <p:nvPr>
-            <p:ph type="subTitle" idx="1"/>
-          </p:nvPr>
-        </p:nvSpPr>
-        <p:spPr/>
-        <p:txBody>
-          <a:bodyPr/>
-          <a:lstStyle/>
+              <a:t>Install Git on your computer</a:t>
+            </a:r>
+          </a:p>
           <a:p>
             <a:r>
               <a:rPr lang="en-US" dirty="0"/>
-              <a:t>By Nate Kurt</a:t>
-            </a:r>
+              <a:t>Make a Git Repo</a:t>
+            </a:r>
+          </a:p>
+          <a:p>
+            <a:r>
+              <a:rPr lang="en-US" dirty="0"/>
+              <a:t>Clone a Git Repo</a:t>
+            </a:r>
+          </a:p>
+          <a:p>
+            <a:r>
+              <a:rPr lang="en-US" dirty="0"/>
+              <a:t>Create an Issue</a:t>
+            </a:r>
+          </a:p>
+          <a:p>
+            <a:r>
+              <a:rPr lang="en-US" dirty="0"/>
+              <a:t>Make a Pull Request</a:t>
+            </a:r>
+          </a:p>
+          <a:p>
+            <a:r>
+              <a:rPr lang="en-US" dirty="0"/>
+              <a:t>Use a GUI for Git</a:t>
+            </a:r>
+          </a:p>
+          <a:p>
+            <a:r>
+              <a:rPr lang="en-US" dirty="0"/>
+              <a:t>Use Git on the Command Line </a:t>
+            </a:r>
+          </a:p>
+          <a:p>
+            <a:r>
+              <a:rPr lang="en-US" dirty="0"/>
+              <a:t>Use Teletype/VS Live Share To Collaborate</a:t>
+            </a:r>
+          </a:p>
+          <a:p>
+            <a:endParaRPr lang="en-US" dirty="0"/>
+          </a:p>
+          <a:p>
+            <a:endParaRPr lang="en-US" dirty="0"/>
           </a:p>
         </p:txBody>
       </p:sp>
     </p:spTree>
     <p:extLst>
       <p:ext uri="{BB962C8B-B14F-4D97-AF65-F5344CB8AC3E}">
-        <p14:creationId xmlns:p14="http://schemas.microsoft.com/office/powerpoint/2010/main" val="3234205232"/>
+        <p14:creationId xmlns:p14="http://schemas.microsoft.com/office/powerpoint/2010/main" val="3366075887"/>
       </p:ext>
     </p:extLst>
   </p:cSld>
   <p:clrMapOvr>
     <a:masterClrMapping/>
   </p:clrMapOvr>
+  <p:timing>
+    <p:tnLst>
+      <p:par>
+        <p:cTn id="1" dur="indefinite" restart="never" nodeType="tmRoot">
+          <p:childTnLst>
+            <p:seq concurrent="1" nextAc="seek">
+              <p:cTn id="2" dur="indefinite" nodeType="mainSeq">
+                <p:childTnLst>
+                  <p:par>
+                    <p:cTn id="3" fill="hold">
+                      <p:stCondLst>
+                        <p:cond delay="indefinite"/>
+                      </p:stCondLst>
+                      <p:childTnLst>
+                        <p:par>
+                          <p:cTn id="4" fill="hold">
+                            <p:stCondLst>
+                              <p:cond delay="0"/>
+                            </p:stCondLst>
+                            <p:childTnLst>
+                              <p:par>
+                                <p:cTn id="5" presetID="1" presetClass="entr" presetSubtype="0" fill="hold" nodeType="clickEffect">
+                                  <p:stCondLst>
+                                    <p:cond delay="0"/>
+                                  </p:stCondLst>
+                                  <p:childTnLst>
+                                    <p:set>
+                                      <p:cBhvr>
+                                        <p:cTn id="6" dur="1" fill="hold">
+                                          <p:stCondLst>
+                                            <p:cond delay="0"/>
+                                          </p:stCondLst>
+                                        </p:cTn>
+                                        <p:tgtEl>
+                                          <p:spTgt spid="3">
+                                            <p:txEl>
+                                              <p:pRg st="0" end="0"/>
+                                            </p:txEl>
+                                          </p:spTgt>
+                                        </p:tgtEl>
+                                        <p:attrNameLst>
+                                          <p:attrName>style.visibility</p:attrName>
+                                        </p:attrNameLst>
+                                      </p:cBhvr>
+                                      <p:to>
+                                        <p:strVal val="visible"/>
+                                      </p:to>
+                                    </p:set>
+                                  </p:childTnLst>
+                                </p:cTn>
+                              </p:par>
+                            </p:childTnLst>
+                          </p:cTn>
+                        </p:par>
+                      </p:childTnLst>
+                    </p:cTn>
+                  </p:par>
+                  <p:par>
+                    <p:cTn id="7" fill="hold">
+                      <p:stCondLst>
+                        <p:cond delay="indefinite"/>
+                      </p:stCondLst>
+                      <p:childTnLst>
+                        <p:par>
+                          <p:cTn id="8" fill="hold">
+                            <p:stCondLst>
+                              <p:cond delay="0"/>
+                            </p:stCondLst>
+                            <p:childTnLst>
+                              <p:par>
+                                <p:cTn id="9" presetID="1" presetClass="entr" presetSubtype="0" fill="hold" nodeType="clickEffect">
+                                  <p:stCondLst>
+                                    <p:cond delay="0"/>
+                                  </p:stCondLst>
+                                  <p:childTnLst>
+                                    <p:set>
+                                      <p:cBhvr>
+                                        <p:cTn id="10" dur="1" fill="hold">
+                                          <p:stCondLst>
+                                            <p:cond delay="0"/>
+                                          </p:stCondLst>
+                                        </p:cTn>
+                                        <p:tgtEl>
+                                          <p:spTgt spid="3">
+                                            <p:txEl>
+                                              <p:pRg st="1" end="1"/>
+                                            </p:txEl>
+                                          </p:spTgt>
+                                        </p:tgtEl>
+                                        <p:attrNameLst>
+                                          <p:attrName>style.visibility</p:attrName>
+                                        </p:attrNameLst>
+                                      </p:cBhvr>
+                                      <p:to>
+                                        <p:strVal val="visible"/>
+                                      </p:to>
+                                    </p:set>
+                                  </p:childTnLst>
+                                </p:cTn>
+                              </p:par>
+                            </p:childTnLst>
+                          </p:cTn>
+                        </p:par>
+                      </p:childTnLst>
+                    </p:cTn>
+                  </p:par>
+                  <p:par>
+                    <p:cTn id="11" fill="hold">
+                      <p:stCondLst>
+                        <p:cond delay="indefinite"/>
+                      </p:stCondLst>
+                      <p:childTnLst>
+                        <p:par>
+                          <p:cTn id="12" fill="hold">
+                            <p:stCondLst>
+                              <p:cond delay="0"/>
+                            </p:stCondLst>
+                            <p:childTnLst>
+                              <p:par>
+                                <p:cTn id="13" presetID="1" presetClass="entr" presetSubtype="0" fill="hold" nodeType="clickEffect">
+                                  <p:stCondLst>
+                                    <p:cond delay="0"/>
+                                  </p:stCondLst>
+                                  <p:childTnLst>
+                                    <p:set>
+                                      <p:cBhvr>
+                                        <p:cTn id="14" dur="1" fill="hold">
+                                          <p:stCondLst>
+                                            <p:cond delay="0"/>
+                                          </p:stCondLst>
+                                        </p:cTn>
+                                        <p:tgtEl>
+                                          <p:spTgt spid="3">
+                                            <p:txEl>
+                                              <p:pRg st="2" end="2"/>
+                                            </p:txEl>
+                                          </p:spTgt>
+                                        </p:tgtEl>
+                                        <p:attrNameLst>
+                                          <p:attrName>style.visibility</p:attrName>
+                                        </p:attrNameLst>
+                                      </p:cBhvr>
+                                      <p:to>
+                                        <p:strVal val="visible"/>
+                                      </p:to>
+                                    </p:set>
+                                  </p:childTnLst>
+                                </p:cTn>
+                              </p:par>
+                            </p:childTnLst>
+                          </p:cTn>
+                        </p:par>
+                      </p:childTnLst>
+                    </p:cTn>
+                  </p:par>
+                  <p:par>
+                    <p:cTn id="15" fill="hold">
+                      <p:stCondLst>
+                        <p:cond delay="indefinite"/>
+                      </p:stCondLst>
+                      <p:childTnLst>
+                        <p:par>
+                          <p:cTn id="16" fill="hold">
+                            <p:stCondLst>
+                              <p:cond delay="0"/>
+                            </p:stCondLst>
+                            <p:childTnLst>
+                              <p:par>
+                                <p:cTn id="17" presetID="1" presetClass="entr" presetSubtype="0" fill="hold" nodeType="clickEffect">
+                                  <p:stCondLst>
+                                    <p:cond delay="0"/>
+                                  </p:stCondLst>
+                                  <p:childTnLst>
+                                    <p:set>
+                                      <p:cBhvr>
+                                        <p:cTn id="18" dur="1" fill="hold">
+                                          <p:stCondLst>
+                                            <p:cond delay="0"/>
+                                          </p:stCondLst>
+                                        </p:cTn>
+                                        <p:tgtEl>
+                                          <p:spTgt spid="3">
+                                            <p:txEl>
+                                              <p:pRg st="3" end="3"/>
+                                            </p:txEl>
+                                          </p:spTgt>
+                                        </p:tgtEl>
+                                        <p:attrNameLst>
+                                          <p:attrName>style.visibility</p:attrName>
+                                        </p:attrNameLst>
+                                      </p:cBhvr>
+                                      <p:to>
+                                        <p:strVal val="visible"/>
+                                      </p:to>
+                                    </p:set>
+                                  </p:childTnLst>
+                                </p:cTn>
+                              </p:par>
+                            </p:childTnLst>
+                          </p:cTn>
+                        </p:par>
+                      </p:childTnLst>
+                    </p:cTn>
+                  </p:par>
+                  <p:par>
+                    <p:cTn id="19" fill="hold">
+                      <p:stCondLst>
+                        <p:cond delay="indefinite"/>
+                      </p:stCondLst>
+                      <p:childTnLst>
+                        <p:par>
+                          <p:cTn id="20" fill="hold">
+                            <p:stCondLst>
+                              <p:cond delay="0"/>
+                            </p:stCondLst>
+                            <p:childTnLst>
+                              <p:par>
+                                <p:cTn id="21" presetID="1" presetClass="entr" presetSubtype="0" fill="hold" nodeType="clickEffect">
+                                  <p:stCondLst>
+                                    <p:cond delay="0"/>
+                                  </p:stCondLst>
+                                  <p:childTnLst>
+                                    <p:set>
+                                      <p:cBhvr>
+                                        <p:cTn id="22" dur="1" fill="hold">
+                                          <p:stCondLst>
+                                            <p:cond delay="0"/>
+                                          </p:stCondLst>
+                                        </p:cTn>
+                                        <p:tgtEl>
+                                          <p:spTgt spid="3">
+                                            <p:txEl>
+                                              <p:pRg st="4" end="4"/>
+                                            </p:txEl>
+                                          </p:spTgt>
+                                        </p:tgtEl>
+                                        <p:attrNameLst>
+                                          <p:attrName>style.visibility</p:attrName>
+                                        </p:attrNameLst>
+                                      </p:cBhvr>
+                                      <p:to>
+                                        <p:strVal val="visible"/>
+                                      </p:to>
+                                    </p:set>
+                                  </p:childTnLst>
+                                </p:cTn>
+                              </p:par>
+                            </p:childTnLst>
+                          </p:cTn>
+                        </p:par>
+                      </p:childTnLst>
+                    </p:cTn>
+                  </p:par>
+                  <p:par>
+                    <p:cTn id="23" fill="hold">
+                      <p:stCondLst>
+                        <p:cond delay="indefinite"/>
+                      </p:stCondLst>
+                      <p:childTnLst>
+                        <p:par>
+                          <p:cTn id="24" fill="hold">
+                            <p:stCondLst>
+                              <p:cond delay="0"/>
+                            </p:stCondLst>
+                            <p:childTnLst>
+                              <p:par>
+                                <p:cTn id="25" presetID="1" presetClass="entr" presetSubtype="0" fill="hold" nodeType="clickEffect">
+                                  <p:stCondLst>
+                                    <p:cond delay="0"/>
+                                  </p:stCondLst>
+                                  <p:childTnLst>
+                                    <p:set>
+                                      <p:cBhvr>
+                                        <p:cTn id="26" dur="1" fill="hold">
+                                          <p:stCondLst>
+                                            <p:cond delay="0"/>
+                                          </p:stCondLst>
+                                        </p:cTn>
+                                        <p:tgtEl>
+                                          <p:spTgt spid="3">
+                                            <p:txEl>
+                                              <p:pRg st="5" end="5"/>
+                                            </p:txEl>
+                                          </p:spTgt>
+                                        </p:tgtEl>
+                                        <p:attrNameLst>
+                                          <p:attrName>style.visibility</p:attrName>
+                                        </p:attrNameLst>
+                                      </p:cBhvr>
+                                      <p:to>
+                                        <p:strVal val="visible"/>
+                                      </p:to>
+                                    </p:set>
+                                  </p:childTnLst>
+                                </p:cTn>
+                              </p:par>
+                            </p:childTnLst>
+                          </p:cTn>
+                        </p:par>
+                      </p:childTnLst>
+                    </p:cTn>
+                  </p:par>
+                  <p:par>
+                    <p:cTn id="27" fill="hold">
+                      <p:stCondLst>
+                        <p:cond delay="indefinite"/>
+                      </p:stCondLst>
+                      <p:childTnLst>
+                        <p:par>
+                          <p:cTn id="28" fill="hold">
+                            <p:stCondLst>
+                              <p:cond delay="0"/>
+                            </p:stCondLst>
+                            <p:childTnLst>
+                              <p:par>
+                                <p:cTn id="29" presetID="1" presetClass="entr" presetSubtype="0" fill="hold" nodeType="clickEffect">
+                                  <p:stCondLst>
+                                    <p:cond delay="0"/>
+                                  </p:stCondLst>
+                                  <p:childTnLst>
+                                    <p:set>
+                                      <p:cBhvr>
+                                        <p:cTn id="30" dur="1" fill="hold">
+                                          <p:stCondLst>
+                                            <p:cond delay="0"/>
+                                          </p:stCondLst>
+                                        </p:cTn>
+                                        <p:tgtEl>
+                                          <p:spTgt spid="3">
+                                            <p:txEl>
+                                              <p:pRg st="6" end="6"/>
+                                            </p:txEl>
+                                          </p:spTgt>
+                                        </p:tgtEl>
+                                        <p:attrNameLst>
+                                          <p:attrName>style.visibility</p:attrName>
+                                        </p:attrNameLst>
+                                      </p:cBhvr>
+                                      <p:to>
+                                        <p:strVal val="visible"/>
+                                      </p:to>
+                                    </p:set>
+                                  </p:childTnLst>
+                                </p:cTn>
+                              </p:par>
+                            </p:childTnLst>
+                          </p:cTn>
+                        </p:par>
+                      </p:childTnLst>
+                    </p:cTn>
+                  </p:par>
+                  <p:par>
+                    <p:cTn id="31" fill="hold">
+                      <p:stCondLst>
+                        <p:cond delay="indefinite"/>
+                      </p:stCondLst>
+                      <p:childTnLst>
+                        <p:par>
+                          <p:cTn id="32" fill="hold">
+                            <p:stCondLst>
+                              <p:cond delay="0"/>
+                            </p:stCondLst>
+                            <p:childTnLst>
+                              <p:par>
+                                <p:cTn id="33" presetID="1" presetClass="entr" presetSubtype="0" fill="hold" nodeType="clickEffect">
+                                  <p:stCondLst>
+                                    <p:cond delay="0"/>
+                                  </p:stCondLst>
+                                  <p:childTnLst>
+                                    <p:set>
+                                      <p:cBhvr>
+                                        <p:cTn id="34" dur="1" fill="hold">
+                                          <p:stCondLst>
+                                            <p:cond delay="0"/>
+                                          </p:stCondLst>
+                                        </p:cTn>
+                                        <p:tgtEl>
+                                          <p:spTgt spid="3">
+                                            <p:txEl>
+                                              <p:pRg st="7" end="7"/>
+                                            </p:txEl>
+                                          </p:spTgt>
+                                        </p:tgtEl>
+                                        <p:attrNameLst>
+                                          <p:attrName>style.visibility</p:attrName>
+                                        </p:attrNameLst>
+                                      </p:cBhvr>
+                                      <p:to>
+                                        <p:strVal val="visible"/>
+                                      </p:to>
+                                    </p:set>
+                                  </p:childTnLst>
+                                </p:cTn>
+                              </p:par>
+                            </p:childTnLst>
+                          </p:cTn>
+                        </p:par>
+                      </p:childTnLst>
+                    </p:cTn>
+                  </p:par>
+                </p:childTnLst>
+              </p:cTn>
+              <p:prevCondLst>
+                <p:cond evt="onPrev" delay="0">
+                  <p:tgtEl>
+                    <p:sldTgt/>
+                  </p:tgtEl>
+                </p:cond>
+              </p:prevCondLst>
+              <p:nextCondLst>
+                <p:cond evt="onNext" delay="0">
+                  <p:tgtEl>
+                    <p:sldTgt/>
+                  </p:tgtEl>
+                </p:cond>
+              </p:nextCondLst>
+            </p:seq>
+          </p:childTnLst>
+        </p:cTn>
+      </p:par>
+    </p:tnLst>
+  </p:timing>
 </p:sld>
 </file>
 
@@ -3498,7 +4573,7 @@
           <p:cNvPr id="2" name="Title 1">
             <a:extLst>
               <a:ext uri="{FF2B5EF4-FFF2-40B4-BE49-F238E27FC236}">
-                <a16:creationId xmlns:a16="http://schemas.microsoft.com/office/drawing/2014/main" id="{AB61CC62-9637-824B-A68A-F25951FCCD43}"/>
+                <a16:creationId xmlns:a16="http://schemas.microsoft.com/office/drawing/2014/main" id="{D90A712C-DDBC-A642-A5FE-A3516695044A}"/>
               </a:ext>
             </a:extLst>
           </p:cNvPr>
@@ -3508,67 +4583,87 @@
           <p:nvPr>
             <p:ph type="title"/>
           </p:nvPr>
+        </p:nvSpPr>
+        <p:spPr/>
+        <p:txBody>
+          <a:bodyPr/>
+          <a:lstStyle/>
+          <a:p>
+            <a:r>
+              <a:rPr lang="en-US" dirty="0"/>
+              <a:t>AND GET A FREE T-SHIRT</a:t>
+            </a:r>
+          </a:p>
+        </p:txBody>
+      </p:sp>
+      <p:sp>
+        <p:nvSpPr>
+          <p:cNvPr id="6" name="TextBox 5">
+            <a:extLst>
+              <a:ext uri="{FF2B5EF4-FFF2-40B4-BE49-F238E27FC236}">
+                <a16:creationId xmlns:a16="http://schemas.microsoft.com/office/drawing/2014/main" id="{3B383452-17E0-AD4F-BFFA-1B58592A8143}"/>
+              </a:ext>
+            </a:extLst>
+          </p:cNvPr>
+          <p:cNvSpPr txBox="1"/>
+          <p:nvPr/>
         </p:nvSpPr>
         <p:spPr>
           <a:xfrm>
-            <a:off x="305763" y="341976"/>
-            <a:ext cx="11697183" cy="1325563"/>
+            <a:off x="1138178" y="1690688"/>
+            <a:ext cx="10401782" cy="4616648"/>
           </a:xfrm>
+          <a:prstGeom prst="rect">
+            <a:avLst/>
+          </a:prstGeom>
+          <a:noFill/>
         </p:spPr>
         <p:txBody>
-          <a:bodyPr>
-            <a:normAutofit/>
+          <a:bodyPr wrap="square" rtlCol="0">
+            <a:spAutoFit/>
           </a:bodyPr>
           <a:lstStyle/>
           <a:p>
             <a:r>
-              <a:rPr lang="en-US" dirty="0"/>
-              <a:t>By the end of this workshop, you should be able to:</a:t>
-            </a:r>
-          </a:p>
-        </p:txBody>
-      </p:sp>
-      <p:sp>
-        <p:nvSpPr>
-          <p:cNvPr id="3" name="Content Placeholder 2">
-            <a:extLst>
-              <a:ext uri="{FF2B5EF4-FFF2-40B4-BE49-F238E27FC236}">
-                <a16:creationId xmlns:a16="http://schemas.microsoft.com/office/drawing/2014/main" id="{CAF7219D-B1AA-2B43-9DCB-1789182DC909}"/>
-              </a:ext>
-            </a:extLst>
-          </p:cNvPr>
-          <p:cNvSpPr>
-            <a:spLocks noGrp="1"/>
-          </p:cNvSpPr>
-          <p:nvPr>
-            <p:ph idx="1"/>
-          </p:nvPr>
-        </p:nvSpPr>
-        <p:spPr/>
-        <p:txBody>
-          <a:bodyPr/>
-          <a:lstStyle/>
-          <a:p>
-            <a:r>
-              <a:rPr lang="en-US" dirty="0"/>
-              <a:t>Make a Git Repo</a:t>
-            </a:r>
-          </a:p>
-          <a:p>
-            <a:r>
-              <a:rPr lang="en-US" dirty="0"/>
-              <a:t>Make a Pull Request</a:t>
-            </a:r>
-          </a:p>
-          <a:p>
+              <a:rPr lang="en-US" sz="6000" dirty="0"/>
+              <a:t>Sign Up </a:t>
+            </a:r>
+            <a:r>
+              <a:rPr lang="en-US" sz="6000" dirty="0" err="1"/>
+              <a:t>Hacktoberfest</a:t>
+            </a:r>
+            <a:endParaRPr lang="en-US" sz="6000" dirty="0"/>
+          </a:p>
+          <a:p>
+            <a:endParaRPr lang="en-US" sz="4800" dirty="0">
+              <a:hlinkClick r:id="rId2"/>
+            </a:endParaRPr>
+          </a:p>
+          <a:p>
+            <a:r>
+              <a:rPr lang="en-US" sz="4800" dirty="0">
+                <a:hlinkClick r:id="rId2"/>
+              </a:rPr>
+              <a:t>https://hacktoberfest.digitalocean.com/</a:t>
+            </a:r>
+            <a:endParaRPr lang="en-US" sz="4800" dirty="0"/>
+          </a:p>
+          <a:p>
+            <a:pPr lvl="1"/>
             <a:endParaRPr lang="en-US" dirty="0"/>
+          </a:p>
+          <a:p>
+            <a:endParaRPr lang="en-US" sz="6000" dirty="0"/>
+          </a:p>
+          <a:p>
+            <a:endParaRPr lang="en-US" sz="6000" dirty="0"/>
           </a:p>
         </p:txBody>
       </p:sp>
     </p:spTree>
     <p:extLst>
       <p:ext uri="{BB962C8B-B14F-4D97-AF65-F5344CB8AC3E}">
-        <p14:creationId xmlns:p14="http://schemas.microsoft.com/office/powerpoint/2010/main" val="3366075887"/>
+        <p14:creationId xmlns:p14="http://schemas.microsoft.com/office/powerpoint/2010/main" val="916078033"/>
       </p:ext>
     </p:extLst>
   </p:cSld>
@@ -3600,7 +4695,7 @@
           <p:cNvPr id="2" name="Title 1">
             <a:extLst>
               <a:ext uri="{FF2B5EF4-FFF2-40B4-BE49-F238E27FC236}">
-                <a16:creationId xmlns:a16="http://schemas.microsoft.com/office/drawing/2014/main" id="{D90A712C-DDBC-A642-A5FE-A3516695044A}"/>
+                <a16:creationId xmlns:a16="http://schemas.microsoft.com/office/drawing/2014/main" id="{89F0BDEF-39C3-DC42-A2A5-CC371FC8A8A1}"/>
               </a:ext>
             </a:extLst>
           </p:cNvPr>
@@ -3611,24 +4706,64 @@
             <p:ph type="title"/>
           </p:nvPr>
         </p:nvSpPr>
-        <p:spPr/>
-        <p:txBody>
-          <a:bodyPr/>
-          <a:lstStyle/>
-          <a:p>
-            <a:r>
-              <a:rPr lang="en-US" dirty="0"/>
-              <a:t>AND GET A FREE T-SHIRT</a:t>
-            </a:r>
-          </a:p>
-        </p:txBody>
-      </p:sp>
-      <p:sp>
-        <p:nvSpPr>
-          <p:cNvPr id="6" name="TextBox 5">
-            <a:extLst>
-              <a:ext uri="{FF2B5EF4-FFF2-40B4-BE49-F238E27FC236}">
-                <a16:creationId xmlns:a16="http://schemas.microsoft.com/office/drawing/2014/main" id="{3B383452-17E0-AD4F-BFFA-1B58592A8143}"/>
+        <p:spPr>
+          <a:xfrm>
+            <a:off x="338137" y="0"/>
+            <a:ext cx="10515600" cy="1325563"/>
+          </a:xfrm>
+        </p:spPr>
+        <p:txBody>
+          <a:bodyPr/>
+          <a:lstStyle/>
+          <a:p>
+            <a:r>
+              <a:rPr lang="en-US" b="1" dirty="0"/>
+              <a:t>Who Am I? </a:t>
+            </a:r>
+          </a:p>
+        </p:txBody>
+      </p:sp>
+      <p:pic>
+        <p:nvPicPr>
+          <p:cNvPr id="5" name="Content Placeholder 4">
+            <a:extLst>
+              <a:ext uri="{FF2B5EF4-FFF2-40B4-BE49-F238E27FC236}">
+                <a16:creationId xmlns:a16="http://schemas.microsoft.com/office/drawing/2014/main" id="{B52EF742-EA9B-8C45-83BC-BE2D3C66E127}"/>
+              </a:ext>
+            </a:extLst>
+          </p:cNvPr>
+          <p:cNvPicPr>
+            <a:picLocks noGrp="1" noChangeAspect="1"/>
+          </p:cNvPicPr>
+          <p:nvPr>
+            <p:ph idx="1"/>
+          </p:nvPr>
+        </p:nvPicPr>
+        <p:blipFill>
+          <a:blip r:embed="rId2">
+            <a:extLst>
+              <a:ext uri="{96DAC541-7B7A-43D3-8B79-37D633B846F1}">
+                <asvg:svgBlip xmlns:asvg="http://schemas.microsoft.com/office/drawing/2016/SVG/main" r:embed="rId3"/>
+              </a:ext>
+            </a:extLst>
+          </a:blip>
+          <a:stretch>
+            <a:fillRect/>
+          </a:stretch>
+        </p:blipFill>
+        <p:spPr>
+          <a:xfrm>
+            <a:off x="7524749" y="1261364"/>
+            <a:ext cx="2804584" cy="2716941"/>
+          </a:xfrm>
+        </p:spPr>
+      </p:pic>
+      <p:sp>
+        <p:nvSpPr>
+          <p:cNvPr id="8" name="TextBox 7">
+            <a:extLst>
+              <a:ext uri="{FF2B5EF4-FFF2-40B4-BE49-F238E27FC236}">
+                <a16:creationId xmlns:a16="http://schemas.microsoft.com/office/drawing/2014/main" id="{DD26D7AD-DCE6-B541-9379-18EE478C3262}"/>
               </a:ext>
             </a:extLst>
           </p:cNvPr>
@@ -3637,8 +4772,8 @@
         </p:nvSpPr>
         <p:spPr>
           <a:xfrm>
-            <a:off x="1138178" y="1690688"/>
-            <a:ext cx="10401782" cy="4616648"/>
+            <a:off x="338136" y="1325563"/>
+            <a:ext cx="7186613" cy="6863417"/>
           </a:xfrm>
           <a:prstGeom prst="rect">
             <a:avLst/>
@@ -3653,44 +4788,116 @@
           <a:p>
             <a:r>
               <a:rPr lang="en-US" sz="6000" dirty="0"/>
-              <a:t>Sign Up </a:t>
-            </a:r>
-            <a:r>
-              <a:rPr lang="en-US" sz="6000" dirty="0" err="1"/>
-              <a:t>Hacktoberfest</a:t>
-            </a:r>
-            <a:endParaRPr lang="en-US" sz="6000" dirty="0"/>
-          </a:p>
-          <a:p>
-            <a:endParaRPr lang="en-US" sz="4800" dirty="0">
-              <a:hlinkClick r:id="rId2"/>
-            </a:endParaRPr>
-          </a:p>
-          <a:p>
-            <a:r>
-              <a:rPr lang="en-US" sz="4800" dirty="0">
-                <a:hlinkClick r:id="rId2"/>
-              </a:rPr>
-              <a:t>https://hacktoberfest.digitalocean.com/</a:t>
-            </a:r>
-            <a:endParaRPr lang="en-US" sz="4800" dirty="0"/>
-          </a:p>
-          <a:p>
-            <a:pPr lvl="1"/>
-            <a:endParaRPr lang="en-US" dirty="0"/>
-          </a:p>
-          <a:p>
-            <a:endParaRPr lang="en-US" sz="6000" dirty="0"/>
-          </a:p>
-          <a:p>
-            <a:endParaRPr lang="en-US" sz="6000" dirty="0"/>
-          </a:p>
-        </p:txBody>
-      </p:sp>
+              <a:t>Nate Kurt</a:t>
+            </a:r>
+          </a:p>
+          <a:p>
+            <a:pPr marL="571500" indent="-571500">
+              <a:buFont typeface="Arial" panose="020B0604020202020204" pitchFamily="34" charset="0"/>
+              <a:buChar char="•"/>
+            </a:pPr>
+            <a:r>
+              <a:rPr lang="en-US" sz="4000" dirty="0"/>
+              <a:t>SpartaHack Executive Director</a:t>
+            </a:r>
+          </a:p>
+          <a:p>
+            <a:pPr marL="571500" indent="-571500">
+              <a:buFont typeface="Arial" panose="020B0604020202020204" pitchFamily="34" charset="0"/>
+              <a:buChar char="•"/>
+            </a:pPr>
+            <a:r>
+              <a:rPr lang="en-US" sz="4000" dirty="0"/>
+              <a:t>GitHub Campus Expert</a:t>
+            </a:r>
+          </a:p>
+          <a:p>
+            <a:pPr marL="571500" indent="-571500">
+              <a:buFont typeface="Arial" panose="020B0604020202020204" pitchFamily="34" charset="0"/>
+              <a:buChar char="•"/>
+            </a:pPr>
+            <a:r>
+              <a:rPr lang="en-US" sz="4000" dirty="0"/>
+              <a:t>Hot Sauce Enthusiast</a:t>
+            </a:r>
+          </a:p>
+          <a:p>
+            <a:pPr marL="571500" indent="-571500">
+              <a:buFont typeface="Arial" panose="020B0604020202020204" pitchFamily="34" charset="0"/>
+              <a:buChar char="•"/>
+            </a:pPr>
+            <a:r>
+              <a:rPr lang="en-US" sz="4000" dirty="0"/>
+              <a:t>Social Media / GitHub: @</a:t>
+            </a:r>
+            <a:r>
+              <a:rPr lang="en-US" sz="4000" dirty="0" err="1"/>
+              <a:t>nathankurt</a:t>
+            </a:r>
+            <a:r>
+              <a:rPr lang="en-US" sz="4000" dirty="0"/>
+              <a:t> </a:t>
+            </a:r>
+          </a:p>
+          <a:p>
+            <a:pPr marL="571500" indent="-571500">
+              <a:buFont typeface="Arial" panose="020B0604020202020204" pitchFamily="34" charset="0"/>
+              <a:buChar char="•"/>
+            </a:pPr>
+            <a:endParaRPr lang="en-US" sz="4000" dirty="0"/>
+          </a:p>
+          <a:p>
+            <a:endParaRPr lang="en-US" sz="4000" dirty="0"/>
+          </a:p>
+          <a:p>
+            <a:pPr marL="571500" indent="-571500">
+              <a:buFont typeface="Arial" panose="020B0604020202020204" pitchFamily="34" charset="0"/>
+              <a:buChar char="•"/>
+            </a:pPr>
+            <a:endParaRPr lang="en-US" sz="4000" dirty="0"/>
+          </a:p>
+          <a:p>
+            <a:r>
+              <a:rPr lang="en-US" sz="6000" dirty="0"/>
+              <a:t> </a:t>
+            </a:r>
+          </a:p>
+        </p:txBody>
+      </p:sp>
+      <p:pic>
+        <p:nvPicPr>
+          <p:cNvPr id="11" name="Picture 10">
+            <a:extLst>
+              <a:ext uri="{FF2B5EF4-FFF2-40B4-BE49-F238E27FC236}">
+                <a16:creationId xmlns:a16="http://schemas.microsoft.com/office/drawing/2014/main" id="{B4FBE5B9-5BA6-6C4C-80EA-931121F391BC}"/>
+              </a:ext>
+            </a:extLst>
+          </p:cNvPr>
+          <p:cNvPicPr>
+            <a:picLocks noChangeAspect="1"/>
+          </p:cNvPicPr>
+          <p:nvPr/>
+        </p:nvPicPr>
+        <p:blipFill>
+          <a:blip r:embed="rId4"/>
+          <a:stretch>
+            <a:fillRect/>
+          </a:stretch>
+        </p:blipFill>
+        <p:spPr>
+          <a:xfrm>
+            <a:off x="7045471" y="3978305"/>
+            <a:ext cx="5146529" cy="2979569"/>
+          </a:xfrm>
+          <a:prstGeom prst="rect">
+            <a:avLst/>
+          </a:prstGeom>
+        </p:spPr>
+      </p:pic>
     </p:spTree>
     <p:extLst>
       <p:ext uri="{BB962C8B-B14F-4D97-AF65-F5344CB8AC3E}">
-        <p14:creationId xmlns:p14="http://schemas.microsoft.com/office/powerpoint/2010/main" val="916078033"/>
+        <p14:creationId xmlns:p14="http://schemas.microsoft.com/office/powerpoint/2010/main" val="512069553"/>
       </p:ext>
     </p:extLst>
   </p:cSld>
@@ -3717,92 +4924,6 @@
           <a:chExt cx="0" cy="0"/>
         </a:xfrm>
       </p:grpSpPr>
-      <p:sp>
-        <p:nvSpPr>
-          <p:cNvPr id="2" name="Title 1">
-            <a:extLst>
-              <a:ext uri="{FF2B5EF4-FFF2-40B4-BE49-F238E27FC236}">
-                <a16:creationId xmlns:a16="http://schemas.microsoft.com/office/drawing/2014/main" id="{89F0BDEF-39C3-DC42-A2A5-CC371FC8A8A1}"/>
-              </a:ext>
-            </a:extLst>
-          </p:cNvPr>
-          <p:cNvSpPr>
-            <a:spLocks noGrp="1"/>
-          </p:cNvSpPr>
-          <p:nvPr>
-            <p:ph type="title"/>
-          </p:nvPr>
-        </p:nvSpPr>
-        <p:spPr/>
-        <p:txBody>
-          <a:bodyPr/>
-          <a:lstStyle/>
-          <a:p>
-            <a:r>
-              <a:rPr lang="en-US" dirty="0"/>
-              <a:t>Who Am I? </a:t>
-            </a:r>
-          </a:p>
-        </p:txBody>
-      </p:sp>
-      <p:sp>
-        <p:nvSpPr>
-          <p:cNvPr id="3" name="Content Placeholder 2">
-            <a:extLst>
-              <a:ext uri="{FF2B5EF4-FFF2-40B4-BE49-F238E27FC236}">
-                <a16:creationId xmlns:a16="http://schemas.microsoft.com/office/drawing/2014/main" id="{1608F1F6-8161-CB4E-9EAA-4BC502E37C51}"/>
-              </a:ext>
-            </a:extLst>
-          </p:cNvPr>
-          <p:cNvSpPr>
-            <a:spLocks noGrp="1"/>
-          </p:cNvSpPr>
-          <p:nvPr>
-            <p:ph idx="1"/>
-          </p:nvPr>
-        </p:nvSpPr>
-        <p:spPr/>
-        <p:txBody>
-          <a:bodyPr/>
-          <a:lstStyle/>
-          <a:p>
-            <a:pPr marL="0" indent="0">
-              <a:buNone/>
-            </a:pPr>
-            <a:endParaRPr lang="en-US" dirty="0"/>
-          </a:p>
-        </p:txBody>
-      </p:sp>
-    </p:spTree>
-    <p:extLst>
-      <p:ext uri="{BB962C8B-B14F-4D97-AF65-F5344CB8AC3E}">
-        <p14:creationId xmlns:p14="http://schemas.microsoft.com/office/powerpoint/2010/main" val="512069553"/>
-      </p:ext>
-    </p:extLst>
-  </p:cSld>
-  <p:clrMapOvr>
-    <a:masterClrMapping/>
-  </p:clrMapOvr>
-</p:sld>
-</file>
-
-<file path=ppt/slides/slide6.xml><?xml version="1.0" encoding="utf-8"?>
-<p:sld xmlns:a="http://schemas.openxmlformats.org/drawingml/2006/main" xmlns:r="http://schemas.openxmlformats.org/officeDocument/2006/relationships" xmlns:p="http://schemas.openxmlformats.org/presentationml/2006/main">
-  <p:cSld>
-    <p:spTree>
-      <p:nvGrpSpPr>
-        <p:cNvPr id="1" name=""/>
-        <p:cNvGrpSpPr/>
-        <p:nvPr/>
-      </p:nvGrpSpPr>
-      <p:grpSpPr>
-        <a:xfrm>
-          <a:off x="0" y="0"/>
-          <a:ext cx="0" cy="0"/>
-          <a:chOff x="0" y="0"/>
-          <a:chExt cx="0" cy="0"/>
-        </a:xfrm>
-      </p:grpSpPr>
       <p:pic>
         <p:nvPicPr>
           <p:cNvPr id="4" name="in the deer 2nite.mp4">
@@ -3834,11 +4955,47 @@
         </p:blipFill>
         <p:spPr>
           <a:xfrm>
-            <a:off x="2042861" y="1744603"/>
+            <a:off x="2042860" y="1730316"/>
             <a:ext cx="7735887" cy="4351338"/>
           </a:xfrm>
         </p:spPr>
       </p:pic>
+      <p:sp>
+        <p:nvSpPr>
+          <p:cNvPr id="5" name="TextBox 4">
+            <a:extLst>
+              <a:ext uri="{FF2B5EF4-FFF2-40B4-BE49-F238E27FC236}">
+                <a16:creationId xmlns:a16="http://schemas.microsoft.com/office/drawing/2014/main" id="{64A6D924-C8BA-4B42-BFF9-7D44BDD3C40C}"/>
+              </a:ext>
+            </a:extLst>
+          </p:cNvPr>
+          <p:cNvSpPr txBox="1"/>
+          <p:nvPr/>
+        </p:nvSpPr>
+        <p:spPr>
+          <a:xfrm>
+            <a:off x="1560259" y="1593494"/>
+            <a:ext cx="8701088" cy="2800767"/>
+          </a:xfrm>
+          <a:prstGeom prst="rect">
+            <a:avLst/>
+          </a:prstGeom>
+          <a:noFill/>
+        </p:spPr>
+        <p:txBody>
+          <a:bodyPr wrap="square" rtlCol="0">
+            <a:spAutoFit/>
+          </a:bodyPr>
+          <a:lstStyle/>
+          <a:p>
+            <a:pPr algn="ctr"/>
+            <a:r>
+              <a:rPr lang="en-US" sz="8800" dirty="0"/>
+              <a:t>Before We Get Started Though</a:t>
+            </a:r>
+          </a:p>
+        </p:txBody>
+      </p:sp>
     </p:spTree>
     <p:extLst>
       <p:ext uri="{BB962C8B-B14F-4D97-AF65-F5344CB8AC3E}">
@@ -3870,14 +5027,86 @@
                             </p:stCondLst>
                             <p:childTnLst>
                               <p:par>
-                                <p:cTn id="5" presetID="1" presetClass="mediacall" presetSubtype="0" fill="hold" nodeType="clickEffect">
+                                <p:cTn id="5" presetID="1" presetClass="entr" presetSubtype="0" fill="hold" nodeType="clickEffect">
+                                  <p:stCondLst>
+                                    <p:cond delay="0"/>
+                                  </p:stCondLst>
+                                  <p:childTnLst>
+                                    <p:set>
+                                      <p:cBhvr>
+                                        <p:cTn id="6" dur="1" fill="hold">
+                                          <p:stCondLst>
+                                            <p:cond delay="0"/>
+                                          </p:stCondLst>
+                                        </p:cTn>
+                                        <p:tgtEl>
+                                          <p:spTgt spid="4"/>
+                                        </p:tgtEl>
+                                        <p:attrNameLst>
+                                          <p:attrName>style.visibility</p:attrName>
+                                        </p:attrNameLst>
+                                      </p:cBhvr>
+                                      <p:to>
+                                        <p:strVal val="visible"/>
+                                      </p:to>
+                                    </p:set>
+                                  </p:childTnLst>
+                                </p:cTn>
+                              </p:par>
+                              <p:par>
+                                <p:cTn id="7" presetID="1" presetClass="exit" presetSubtype="0" fill="hold" grpId="0" nodeType="withEffect">
+                                  <p:stCondLst>
+                                    <p:cond delay="0"/>
+                                  </p:stCondLst>
+                                  <p:childTnLst>
+                                    <p:set>
+                                      <p:cBhvr>
+                                        <p:cTn id="8" dur="1" fill="hold">
+                                          <p:stCondLst>
+                                            <p:cond delay="0"/>
+                                          </p:stCondLst>
+                                        </p:cTn>
+                                        <p:tgtEl>
+                                          <p:spTgt spid="5"/>
+                                        </p:tgtEl>
+                                        <p:attrNameLst>
+                                          <p:attrName>style.visibility</p:attrName>
+                                        </p:attrNameLst>
+                                      </p:cBhvr>
+                                      <p:to>
+                                        <p:strVal val="hidden"/>
+                                      </p:to>
+                                    </p:set>
+                                  </p:childTnLst>
+                                </p:cTn>
+                              </p:par>
+                            </p:childTnLst>
+                          </p:cTn>
+                        </p:par>
+                      </p:childTnLst>
+                    </p:cTn>
+                  </p:par>
+                  <p:par>
+                    <p:cTn id="9" fill="hold">
+                      <p:stCondLst>
+                        <p:cond delay="indefinite"/>
+                      </p:stCondLst>
+                      <p:childTnLst>
+                        <p:par>
+                          <p:cTn id="10" fill="hold">
+                            <p:stCondLst>
+                              <p:cond delay="0"/>
+                            </p:stCondLst>
+                            <p:childTnLst>
+                              <p:par>
+                                <p:cTn id="11" presetID="1" presetClass="mediacall" presetSubtype="0" fill="hold" nodeType="clickEffect">
                                   <p:stCondLst>
                                     <p:cond delay="0"/>
                                   </p:stCondLst>
                                   <p:childTnLst>
                                     <p:cmd type="call" cmd="playFrom(0.0)">
                                       <p:cBhvr>
-                                        <p:cTn id="6" dur="18251" fill="hold"/>
+                                        <p:cTn id="12" dur="18251" fill="hold"/>
                                         <p:tgtEl>
                                           <p:spTgt spid="4"/>
                                         </p:tgtEl>
@@ -3911,7 +5140,7 @@
             </p:seq>
             <p:video>
               <p:cMediaNode vol="100000">
-                <p:cTn id="7" fill="hold" display="0">
+                <p:cTn id="13" fill="hold" display="0">
                   <p:stCondLst>
                     <p:cond delay="indefinite"/>
                   </p:stCondLst>
@@ -3922,7 +5151,7 @@
               </p:cMediaNode>
             </p:video>
             <p:seq concurrent="1" nextAc="seek">
-              <p:cTn id="8" restart="whenNotActive" fill="hold" evtFilter="cancelBubble" nodeType="interactiveSeq">
+              <p:cTn id="14" restart="whenNotActive" fill="hold" evtFilter="cancelBubble" nodeType="interactiveSeq">
                 <p:stCondLst>
                   <p:cond evt="onClick" delay="0">
                     <p:tgtEl>
@@ -3935,26 +5164,26 @@
                 </p:endSync>
                 <p:childTnLst>
                   <p:par>
-                    <p:cTn id="9" fill="hold">
+                    <p:cTn id="15" fill="hold">
                       <p:stCondLst>
                         <p:cond delay="0"/>
                       </p:stCondLst>
                       <p:childTnLst>
                         <p:par>
-                          <p:cTn id="10" fill="hold">
+                          <p:cTn id="16" fill="hold">
                             <p:stCondLst>
                               <p:cond delay="0"/>
                             </p:stCondLst>
                             <p:childTnLst>
                               <p:par>
-                                <p:cTn id="11" presetID="2" presetClass="mediacall" presetSubtype="0" fill="hold" nodeType="clickEffect">
+                                <p:cTn id="17" presetID="2" presetClass="mediacall" presetSubtype="0" fill="hold" nodeType="clickEffect">
                                   <p:stCondLst>
                                     <p:cond delay="0"/>
                                   </p:stCondLst>
                                   <p:childTnLst>
                                     <p:cmd type="call" cmd="togglePause">
                                       <p:cBhvr>
-                                        <p:cTn id="12" dur="1" fill="hold"/>
+                                        <p:cTn id="18" dur="1" fill="hold"/>
                                         <p:tgtEl>
                                           <p:spTgt spid="4"/>
                                         </p:tgtEl>
@@ -3983,7 +5212,136 @@
         </p:cTn>
       </p:par>
     </p:tnLst>
+    <p:bldLst>
+      <p:bldP spid="5" grpId="0"/>
+    </p:bldLst>
   </p:timing>
+</p:sld>
+</file>
+
+<file path=ppt/slides/slide6.xml><?xml version="1.0" encoding="utf-8"?>
+<p:sld xmlns:a="http://schemas.openxmlformats.org/drawingml/2006/main" xmlns:r="http://schemas.openxmlformats.org/officeDocument/2006/relationships" xmlns:p="http://schemas.openxmlformats.org/presentationml/2006/main">
+  <p:cSld>
+    <p:spTree>
+      <p:nvGrpSpPr>
+        <p:cNvPr id="1" name=""/>
+        <p:cNvGrpSpPr/>
+        <p:nvPr/>
+      </p:nvGrpSpPr>
+      <p:grpSpPr>
+        <a:xfrm>
+          <a:off x="0" y="0"/>
+          <a:ext cx="0" cy="0"/>
+          <a:chOff x="0" y="0"/>
+          <a:chExt cx="0" cy="0"/>
+        </a:xfrm>
+      </p:grpSpPr>
+      <p:sp>
+        <p:nvSpPr>
+          <p:cNvPr id="2" name="Title 1">
+            <a:extLst>
+              <a:ext uri="{FF2B5EF4-FFF2-40B4-BE49-F238E27FC236}">
+                <a16:creationId xmlns:a16="http://schemas.microsoft.com/office/drawing/2014/main" id="{F8741A9B-22DF-A041-A5D1-8A8BA5D1DB67}"/>
+              </a:ext>
+            </a:extLst>
+          </p:cNvPr>
+          <p:cNvSpPr>
+            <a:spLocks noGrp="1"/>
+          </p:cNvSpPr>
+          <p:nvPr>
+            <p:ph type="title"/>
+          </p:nvPr>
+        </p:nvSpPr>
+        <p:spPr/>
+        <p:txBody>
+          <a:bodyPr/>
+          <a:lstStyle/>
+          <a:p>
+            <a:r>
+              <a:rPr lang="en-US" dirty="0"/>
+              <a:t>Some Tools To Have</a:t>
+            </a:r>
+          </a:p>
+        </p:txBody>
+      </p:sp>
+      <p:sp>
+        <p:nvSpPr>
+          <p:cNvPr id="3" name="Content Placeholder 2">
+            <a:extLst>
+              <a:ext uri="{FF2B5EF4-FFF2-40B4-BE49-F238E27FC236}">
+                <a16:creationId xmlns:a16="http://schemas.microsoft.com/office/drawing/2014/main" id="{9EC64E50-200A-064C-A233-5FC70DA69896}"/>
+              </a:ext>
+            </a:extLst>
+          </p:cNvPr>
+          <p:cNvSpPr>
+            <a:spLocks noGrp="1"/>
+          </p:cNvSpPr>
+          <p:nvPr>
+            <p:ph idx="1"/>
+          </p:nvPr>
+        </p:nvSpPr>
+        <p:spPr/>
+        <p:txBody>
+          <a:bodyPr/>
+          <a:lstStyle/>
+          <a:p>
+            <a:r>
+              <a:rPr lang="en-US" dirty="0"/>
+              <a:t>Git</a:t>
+            </a:r>
+          </a:p>
+          <a:p>
+            <a:r>
+              <a:rPr lang="en-US" dirty="0"/>
+              <a:t>Git Bash(Windows Only) </a:t>
+            </a:r>
+          </a:p>
+          <a:p>
+            <a:r>
+              <a:rPr lang="en-US" dirty="0"/>
+              <a:t>Student Developer Pack(</a:t>
+            </a:r>
+            <a:r>
+              <a:rPr lang="en-US" dirty="0">
+                <a:hlinkClick r:id="rId2"/>
+              </a:rPr>
+              <a:t>education.github.com/pack</a:t>
+            </a:r>
+            <a:r>
+              <a:rPr lang="en-US" dirty="0"/>
+              <a:t>)</a:t>
+            </a:r>
+          </a:p>
+          <a:p>
+            <a:r>
+              <a:rPr lang="en-US" dirty="0"/>
+              <a:t>Visual Studio Code With Live Share Extension</a:t>
+            </a:r>
+          </a:p>
+          <a:p>
+            <a:pPr marL="0" indent="0">
+              <a:buNone/>
+            </a:pPr>
+            <a:endParaRPr lang="en-US" dirty="0"/>
+          </a:p>
+          <a:p>
+            <a:endParaRPr lang="en-US" dirty="0"/>
+          </a:p>
+          <a:p>
+            <a:endParaRPr lang="en-US" dirty="0"/>
+          </a:p>
+        </p:txBody>
+      </p:sp>
+    </p:spTree>
+    <p:extLst>
+      <p:ext uri="{BB962C8B-B14F-4D97-AF65-F5344CB8AC3E}">
+        <p14:creationId xmlns:p14="http://schemas.microsoft.com/office/powerpoint/2010/main" val="3450259770"/>
+      </p:ext>
+    </p:extLst>
+  </p:cSld>
+  <p:clrMapOvr>
+    <a:masterClrMapping/>
+  </p:clrMapOvr>
 </p:sld>
 </file>
 
@@ -4006,51 +5364,56 @@
       </p:grpSpPr>
       <p:sp>
         <p:nvSpPr>
-          <p:cNvPr id="2" name="Title 1">
-            <a:extLst>
-              <a:ext uri="{FF2B5EF4-FFF2-40B4-BE49-F238E27FC236}">
-                <a16:creationId xmlns:a16="http://schemas.microsoft.com/office/drawing/2014/main" id="{DBA273BB-4B22-DF45-A327-9AEF545E58FA}"/>
-              </a:ext>
-            </a:extLst>
-          </p:cNvPr>
-          <p:cNvSpPr>
-            <a:spLocks noGrp="1"/>
-          </p:cNvSpPr>
-          <p:nvPr>
-            <p:ph type="title"/>
-          </p:nvPr>
-        </p:nvSpPr>
-        <p:spPr/>
-        <p:txBody>
-          <a:bodyPr/>
-          <a:lstStyle/>
-          <a:p>
-            <a:endParaRPr lang="en-US" dirty="0"/>
-          </a:p>
-        </p:txBody>
-      </p:sp>
-      <p:sp>
-        <p:nvSpPr>
-          <p:cNvPr id="3" name="Content Placeholder 2">
-            <a:extLst>
-              <a:ext uri="{FF2B5EF4-FFF2-40B4-BE49-F238E27FC236}">
-                <a16:creationId xmlns:a16="http://schemas.microsoft.com/office/drawing/2014/main" id="{09BB61EA-B772-0444-B6D0-115146C3BD75}"/>
-              </a:ext>
-            </a:extLst>
-          </p:cNvPr>
-          <p:cNvSpPr>
-            <a:spLocks noGrp="1"/>
-          </p:cNvSpPr>
-          <p:nvPr>
-            <p:ph idx="1"/>
-          </p:nvPr>
-        </p:nvSpPr>
-        <p:spPr/>
-        <p:txBody>
-          <a:bodyPr/>
-          <a:lstStyle/>
-          <a:p>
-            <a:endParaRPr lang="en-US"/>
+          <p:cNvPr id="6" name="Title 1">
+            <a:extLst>
+              <a:ext uri="{FF2B5EF4-FFF2-40B4-BE49-F238E27FC236}">
+                <a16:creationId xmlns:a16="http://schemas.microsoft.com/office/drawing/2014/main" id="{67FA47FA-C0F7-B542-BF1C-3B08014DCC0B}"/>
+              </a:ext>
+            </a:extLst>
+          </p:cNvPr>
+          <p:cNvSpPr txBox="1">
+            <a:spLocks/>
+          </p:cNvSpPr>
+          <p:nvPr/>
+        </p:nvSpPr>
+        <p:spPr>
+          <a:xfrm>
+            <a:off x="0" y="2208212"/>
+            <a:ext cx="12192000" cy="2387600"/>
+          </a:xfrm>
+          <a:prstGeom prst="rect">
+            <a:avLst/>
+          </a:prstGeom>
+        </p:spPr>
+        <p:txBody>
+          <a:bodyPr vert="horz" lIns="91440" tIns="45720" rIns="91440" bIns="45720" rtlCol="0" anchor="ctr">
+            <a:normAutofit/>
+          </a:bodyPr>
+          <a:lstStyle>
+            <a:lvl1pPr algn="l" defTabSz="914400" rtl="0" eaLnBrk="1" latinLnBrk="0" hangingPunct="1">
+              <a:lnSpc>
+                <a:spcPct val="90000"/>
+              </a:lnSpc>
+              <a:spcBef>
+                <a:spcPct val="0"/>
+              </a:spcBef>
+              <a:buNone/>
+              <a:defRPr sz="4400" kern="1200">
+                <a:solidFill>
+                  <a:schemeClr val="tx1"/>
+                </a:solidFill>
+                <a:latin typeface="+mj-lt"/>
+                <a:ea typeface="+mj-ea"/>
+                <a:cs typeface="+mj-cs"/>
+              </a:defRPr>
+            </a:lvl1pPr>
+          </a:lstStyle>
+          <a:p>
+            <a:pPr algn="ctr"/>
+            <a:r>
+              <a:rPr lang="en-US" sz="9600" dirty="0"/>
+              <a:t>Installing Git</a:t>
+            </a:r>
           </a:p>
         </p:txBody>
       </p:sp>
@@ -4058,6 +5421,319 @@
     <p:extLst>
       <p:ext uri="{BB962C8B-B14F-4D97-AF65-F5344CB8AC3E}">
         <p14:creationId xmlns:p14="http://schemas.microsoft.com/office/powerpoint/2010/main" val="3499847923"/>
+      </p:ext>
+    </p:extLst>
+  </p:cSld>
+  <p:clrMapOvr>
+    <a:masterClrMapping/>
+  </p:clrMapOvr>
+</p:sld>
+</file>
+
+<file path=ppt/slides/slide8.xml><?xml version="1.0" encoding="utf-8"?>
+<p:sld xmlns:a="http://schemas.openxmlformats.org/drawingml/2006/main" xmlns:r="http://schemas.openxmlformats.org/officeDocument/2006/relationships" xmlns:p="http://schemas.openxmlformats.org/presentationml/2006/main">
+  <p:cSld>
+    <p:spTree>
+      <p:nvGrpSpPr>
+        <p:cNvPr id="1" name=""/>
+        <p:cNvGrpSpPr/>
+        <p:nvPr/>
+      </p:nvGrpSpPr>
+      <p:grpSpPr>
+        <a:xfrm>
+          <a:off x="0" y="0"/>
+          <a:ext cx="0" cy="0"/>
+          <a:chOff x="0" y="0"/>
+          <a:chExt cx="0" cy="0"/>
+        </a:xfrm>
+      </p:grpSpPr>
+      <p:sp>
+        <p:nvSpPr>
+          <p:cNvPr id="2" name="Title 1">
+            <a:extLst>
+              <a:ext uri="{FF2B5EF4-FFF2-40B4-BE49-F238E27FC236}">
+                <a16:creationId xmlns:a16="http://schemas.microsoft.com/office/drawing/2014/main" id="{79CBAE83-306E-604D-9CF4-324C552AD2B2}"/>
+              </a:ext>
+            </a:extLst>
+          </p:cNvPr>
+          <p:cNvSpPr>
+            <a:spLocks noGrp="1"/>
+          </p:cNvSpPr>
+          <p:nvPr>
+            <p:ph type="title"/>
+          </p:nvPr>
+        </p:nvSpPr>
+        <p:spPr/>
+        <p:txBody>
+          <a:bodyPr/>
+          <a:lstStyle/>
+          <a:p>
+            <a:r>
+              <a:rPr lang="en-US" dirty="0" err="1"/>
+              <a:t>Uhhhh</a:t>
+            </a:r>
+            <a:r>
+              <a:rPr lang="en-US" dirty="0"/>
+              <a:t> Wait….</a:t>
+            </a:r>
+          </a:p>
+        </p:txBody>
+      </p:sp>
+      <p:sp>
+        <p:nvSpPr>
+          <p:cNvPr id="3" name="Content Placeholder 2">
+            <a:extLst>
+              <a:ext uri="{FF2B5EF4-FFF2-40B4-BE49-F238E27FC236}">
+                <a16:creationId xmlns:a16="http://schemas.microsoft.com/office/drawing/2014/main" id="{5F8B5F64-2E05-F146-9CCA-A6603EE755E5}"/>
+              </a:ext>
+            </a:extLst>
+          </p:cNvPr>
+          <p:cNvSpPr>
+            <a:spLocks noGrp="1"/>
+          </p:cNvSpPr>
+          <p:nvPr>
+            <p:ph idx="1"/>
+          </p:nvPr>
+        </p:nvSpPr>
+        <p:spPr>
+          <a:xfrm>
+            <a:off x="838200" y="1825625"/>
+            <a:ext cx="10515600" cy="3001018"/>
+          </a:xfrm>
+        </p:spPr>
+        <p:txBody>
+          <a:bodyPr/>
+          <a:lstStyle/>
+          <a:p>
+            <a:pPr marL="0" indent="0">
+              <a:buNone/>
+            </a:pPr>
+            <a:r>
+              <a:rPr lang="en-US" sz="4400" dirty="0"/>
+              <a:t>”Before you make me install some more garbage on my computer, can you tell me what it is first?” </a:t>
+            </a:r>
+          </a:p>
+          <a:p>
+            <a:pPr marL="0" indent="0">
+              <a:buNone/>
+            </a:pPr>
+            <a:endParaRPr lang="en-US" dirty="0"/>
+          </a:p>
+        </p:txBody>
+      </p:sp>
+      <p:pic>
+        <p:nvPicPr>
+          <p:cNvPr id="5" name="Picture 4">
+            <a:extLst>
+              <a:ext uri="{FF2B5EF4-FFF2-40B4-BE49-F238E27FC236}">
+                <a16:creationId xmlns:a16="http://schemas.microsoft.com/office/drawing/2014/main" id="{3FD80D2C-24ED-884F-8DCD-C843F2C8A096}"/>
+              </a:ext>
+            </a:extLst>
+          </p:cNvPr>
+          <p:cNvPicPr>
+            <a:picLocks noChangeAspect="1"/>
+          </p:cNvPicPr>
+          <p:nvPr/>
+        </p:nvPicPr>
+        <p:blipFill>
+          <a:blip r:embed="rId2"/>
+          <a:stretch>
+            <a:fillRect/>
+          </a:stretch>
+        </p:blipFill>
+        <p:spPr>
+          <a:xfrm>
+            <a:off x="4837112" y="3523305"/>
+            <a:ext cx="5532594" cy="3120383"/>
+          </a:xfrm>
+          <a:prstGeom prst="rect">
+            <a:avLst/>
+          </a:prstGeom>
+        </p:spPr>
+      </p:pic>
+    </p:spTree>
+    <p:extLst>
+      <p:ext uri="{BB962C8B-B14F-4D97-AF65-F5344CB8AC3E}">
+        <p14:creationId xmlns:p14="http://schemas.microsoft.com/office/powerpoint/2010/main" val="1860398503"/>
+      </p:ext>
+    </p:extLst>
+  </p:cSld>
+  <p:clrMapOvr>
+    <a:masterClrMapping/>
+  </p:clrMapOvr>
+  <p:timing>
+    <p:tnLst>
+      <p:par>
+        <p:cTn id="1" dur="indefinite" restart="never" nodeType="tmRoot">
+          <p:childTnLst>
+            <p:seq concurrent="1" nextAc="seek">
+              <p:cTn id="2" dur="indefinite" nodeType="mainSeq">
+                <p:childTnLst>
+                  <p:par>
+                    <p:cTn id="3" fill="hold">
+                      <p:stCondLst>
+                        <p:cond delay="indefinite"/>
+                      </p:stCondLst>
+                      <p:childTnLst>
+                        <p:par>
+                          <p:cTn id="4" fill="hold">
+                            <p:stCondLst>
+                              <p:cond delay="0"/>
+                            </p:stCondLst>
+                            <p:childTnLst>
+                              <p:par>
+                                <p:cTn id="5" presetID="1" presetClass="entr" presetSubtype="0" fill="hold" nodeType="clickEffect">
+                                  <p:stCondLst>
+                                    <p:cond delay="0"/>
+                                  </p:stCondLst>
+                                  <p:childTnLst>
+                                    <p:set>
+                                      <p:cBhvr>
+                                        <p:cTn id="6" dur="1" fill="hold">
+                                          <p:stCondLst>
+                                            <p:cond delay="0"/>
+                                          </p:stCondLst>
+                                        </p:cTn>
+                                        <p:tgtEl>
+                                          <p:spTgt spid="3">
+                                            <p:txEl>
+                                              <p:pRg st="0" end="0"/>
+                                            </p:txEl>
+                                          </p:spTgt>
+                                        </p:tgtEl>
+                                        <p:attrNameLst>
+                                          <p:attrName>style.visibility</p:attrName>
+                                        </p:attrNameLst>
+                                      </p:cBhvr>
+                                      <p:to>
+                                        <p:strVal val="visible"/>
+                                      </p:to>
+                                    </p:set>
+                                  </p:childTnLst>
+                                </p:cTn>
+                              </p:par>
+                            </p:childTnLst>
+                          </p:cTn>
+                        </p:par>
+                      </p:childTnLst>
+                    </p:cTn>
+                  </p:par>
+                </p:childTnLst>
+              </p:cTn>
+              <p:prevCondLst>
+                <p:cond evt="onPrev" delay="0">
+                  <p:tgtEl>
+                    <p:sldTgt/>
+                  </p:tgtEl>
+                </p:cond>
+              </p:prevCondLst>
+              <p:nextCondLst>
+                <p:cond evt="onNext" delay="0">
+                  <p:tgtEl>
+                    <p:sldTgt/>
+                  </p:tgtEl>
+                </p:cond>
+              </p:nextCondLst>
+            </p:seq>
+          </p:childTnLst>
+        </p:cTn>
+      </p:par>
+    </p:tnLst>
+  </p:timing>
+</p:sld>
+</file>
+
+<file path=ppt/slides/slide9.xml><?xml version="1.0" encoding="utf-8"?>
+<p:sld xmlns:a="http://schemas.openxmlformats.org/drawingml/2006/main" xmlns:r="http://schemas.openxmlformats.org/officeDocument/2006/relationships" xmlns:p="http://schemas.openxmlformats.org/presentationml/2006/main">
+  <p:cSld>
+    <p:spTree>
+      <p:nvGrpSpPr>
+        <p:cNvPr id="1" name=""/>
+        <p:cNvGrpSpPr/>
+        <p:nvPr/>
+      </p:nvGrpSpPr>
+      <p:grpSpPr>
+        <a:xfrm>
+          <a:off x="0" y="0"/>
+          <a:ext cx="0" cy="0"/>
+          <a:chOff x="0" y="0"/>
+          <a:chExt cx="0" cy="0"/>
+        </a:xfrm>
+      </p:grpSpPr>
+      <p:sp>
+        <p:nvSpPr>
+          <p:cNvPr id="2" name="Title 1">
+            <a:extLst>
+              <a:ext uri="{FF2B5EF4-FFF2-40B4-BE49-F238E27FC236}">
+                <a16:creationId xmlns:a16="http://schemas.microsoft.com/office/drawing/2014/main" id="{74B341AB-6940-5942-9AAD-F26BC0A35C03}"/>
+              </a:ext>
+            </a:extLst>
+          </p:cNvPr>
+          <p:cNvSpPr>
+            <a:spLocks noGrp="1"/>
+          </p:cNvSpPr>
+          <p:nvPr>
+            <p:ph type="title"/>
+          </p:nvPr>
+        </p:nvSpPr>
+        <p:spPr/>
+        <p:txBody>
+          <a:bodyPr/>
+          <a:lstStyle/>
+          <a:p>
+            <a:r>
+              <a:rPr lang="en-US" dirty="0"/>
+              <a:t>What is Git?</a:t>
+            </a:r>
+          </a:p>
+        </p:txBody>
+      </p:sp>
+      <p:sp>
+        <p:nvSpPr>
+          <p:cNvPr id="3" name="Content Placeholder 2">
+            <a:extLst>
+              <a:ext uri="{FF2B5EF4-FFF2-40B4-BE49-F238E27FC236}">
+                <a16:creationId xmlns:a16="http://schemas.microsoft.com/office/drawing/2014/main" id="{165D361B-201E-D542-A831-066D06F1754E}"/>
+              </a:ext>
+            </a:extLst>
+          </p:cNvPr>
+          <p:cNvSpPr>
+            <a:spLocks noGrp="1"/>
+          </p:cNvSpPr>
+          <p:nvPr>
+            <p:ph idx="1"/>
+          </p:nvPr>
+        </p:nvSpPr>
+        <p:spPr/>
+        <p:txBody>
+          <a:bodyPr>
+            <a:normAutofit/>
+          </a:bodyPr>
+          <a:lstStyle/>
+          <a:p>
+            <a:r>
+              <a:rPr lang="en-US" sz="6000" dirty="0"/>
+              <a:t>Git is good version control</a:t>
+            </a:r>
+          </a:p>
+          <a:p>
+            <a:r>
+              <a:rPr lang="en-US" sz="6000" dirty="0"/>
+              <a:t>Undo changes</a:t>
+            </a:r>
+          </a:p>
+          <a:p>
+            <a:r>
+              <a:rPr lang="en-US" sz="6000" dirty="0"/>
+              <a:t>Searchable history</a:t>
+            </a:r>
+          </a:p>
+        </p:txBody>
+      </p:sp>
+    </p:spTree>
+    <p:extLst>
+      <p:ext uri="{BB962C8B-B14F-4D97-AF65-F5344CB8AC3E}">
+        <p14:creationId xmlns:p14="http://schemas.microsoft.com/office/powerpoint/2010/main" val="357382059"/>
       </p:ext>
     </p:extLst>
   </p:cSld>

</xml_diff>

<commit_message>
did some changes I don't remember
</commit_message>
<xml_diff>
--- a/slides_ppt.pptx
+++ b/slides_ppt.pptx
@@ -4,6 +4,9 @@
   <p:sldMasterIdLst>
     <p:sldMasterId id="2147483648" r:id="rId1"/>
   </p:sldMasterIdLst>
+  <p:notesMasterIdLst>
+    <p:notesMasterId r:id="rId15"/>
+  </p:notesMasterIdLst>
   <p:sldIdLst>
     <p:sldId id="256" r:id="rId2"/>
     <p:sldId id="257" r:id="rId3"/>
@@ -17,8 +20,7 @@
     <p:sldId id="264" r:id="rId11"/>
     <p:sldId id="268" r:id="rId12"/>
     <p:sldId id="266" r:id="rId13"/>
-    <p:sldId id="269" r:id="rId14"/>
-    <p:sldId id="270" r:id="rId15"/>
+    <p:sldId id="272" r:id="rId14"/>
   </p:sldIdLst>
   <p:sldSz cx="12192000" cy="6858000"/>
   <p:notesSz cx="6858000" cy="9144000"/>
@@ -118,6 +120,442 @@
     </a:lvl9pPr>
   </p:defaultTextStyle>
 </p:presentation>
+</file>
+
+<file path=ppt/notesMasters/notesMaster1.xml><?xml version="1.0" encoding="utf-8"?>
+<p:notesMaster xmlns:a="http://schemas.openxmlformats.org/drawingml/2006/main" xmlns:r="http://schemas.openxmlformats.org/officeDocument/2006/relationships" xmlns:p="http://schemas.openxmlformats.org/presentationml/2006/main">
+  <p:cSld>
+    <p:bg>
+      <p:bgRef idx="1001">
+        <a:schemeClr val="bg1"/>
+      </p:bgRef>
+    </p:bg>
+    <p:spTree>
+      <p:nvGrpSpPr>
+        <p:cNvPr id="1" name=""/>
+        <p:cNvGrpSpPr/>
+        <p:nvPr/>
+      </p:nvGrpSpPr>
+      <p:grpSpPr>
+        <a:xfrm>
+          <a:off x="0" y="0"/>
+          <a:ext cx="0" cy="0"/>
+          <a:chOff x="0" y="0"/>
+          <a:chExt cx="0" cy="0"/>
+        </a:xfrm>
+      </p:grpSpPr>
+      <p:sp>
+        <p:nvSpPr>
+          <p:cNvPr id="2" name="Header Placeholder 1"/>
+          <p:cNvSpPr>
+            <a:spLocks noGrp="1"/>
+          </p:cNvSpPr>
+          <p:nvPr>
+            <p:ph type="hdr" sz="quarter"/>
+          </p:nvPr>
+        </p:nvSpPr>
+        <p:spPr>
+          <a:xfrm>
+            <a:off x="0" y="0"/>
+            <a:ext cx="2971800" cy="458788"/>
+          </a:xfrm>
+          <a:prstGeom prst="rect">
+            <a:avLst/>
+          </a:prstGeom>
+        </p:spPr>
+        <p:txBody>
+          <a:bodyPr vert="horz" lIns="91440" tIns="45720" rIns="91440" bIns="45720" rtlCol="0"/>
+          <a:lstStyle>
+            <a:lvl1pPr algn="l">
+              <a:defRPr sz="1200"/>
+            </a:lvl1pPr>
+          </a:lstStyle>
+          <a:p>
+            <a:endParaRPr lang="en-US"/>
+          </a:p>
+        </p:txBody>
+      </p:sp>
+      <p:sp>
+        <p:nvSpPr>
+          <p:cNvPr id="3" name="Date Placeholder 2"/>
+          <p:cNvSpPr>
+            <a:spLocks noGrp="1"/>
+          </p:cNvSpPr>
+          <p:nvPr>
+            <p:ph type="dt" idx="1"/>
+          </p:nvPr>
+        </p:nvSpPr>
+        <p:spPr>
+          <a:xfrm>
+            <a:off x="3884613" y="0"/>
+            <a:ext cx="2971800" cy="458788"/>
+          </a:xfrm>
+          <a:prstGeom prst="rect">
+            <a:avLst/>
+          </a:prstGeom>
+        </p:spPr>
+        <p:txBody>
+          <a:bodyPr vert="horz" lIns="91440" tIns="45720" rIns="91440" bIns="45720" rtlCol="0"/>
+          <a:lstStyle>
+            <a:lvl1pPr algn="r">
+              <a:defRPr sz="1200"/>
+            </a:lvl1pPr>
+          </a:lstStyle>
+          <a:p>
+            <a:fld id="{FA47FDF6-1B4E-E949-9C6D-E86858194618}" type="datetimeFigureOut">
+              <a:rPr lang="en-US" smtClean="0"/>
+              <a:t>10/5/18</a:t>
+            </a:fld>
+            <a:endParaRPr lang="en-US"/>
+          </a:p>
+        </p:txBody>
+      </p:sp>
+      <p:sp>
+        <p:nvSpPr>
+          <p:cNvPr id="4" name="Slide Image Placeholder 3"/>
+          <p:cNvSpPr>
+            <a:spLocks noGrp="1" noRot="1" noChangeAspect="1"/>
+          </p:cNvSpPr>
+          <p:nvPr>
+            <p:ph type="sldImg" idx="2"/>
+          </p:nvPr>
+        </p:nvSpPr>
+        <p:spPr>
+          <a:xfrm>
+            <a:off x="685800" y="1143000"/>
+            <a:ext cx="5486400" cy="3086100"/>
+          </a:xfrm>
+          <a:prstGeom prst="rect">
+            <a:avLst/>
+          </a:prstGeom>
+          <a:noFill/>
+          <a:ln w="12700">
+            <a:solidFill>
+              <a:prstClr val="black"/>
+            </a:solidFill>
+          </a:ln>
+        </p:spPr>
+        <p:txBody>
+          <a:bodyPr vert="horz" lIns="91440" tIns="45720" rIns="91440" bIns="45720" rtlCol="0" anchor="ctr"/>
+          <a:lstStyle/>
+          <a:p>
+            <a:endParaRPr lang="en-US"/>
+          </a:p>
+        </p:txBody>
+      </p:sp>
+      <p:sp>
+        <p:nvSpPr>
+          <p:cNvPr id="5" name="Notes Placeholder 4"/>
+          <p:cNvSpPr>
+            <a:spLocks noGrp="1"/>
+          </p:cNvSpPr>
+          <p:nvPr>
+            <p:ph type="body" sz="quarter" idx="3"/>
+          </p:nvPr>
+        </p:nvSpPr>
+        <p:spPr>
+          <a:xfrm>
+            <a:off x="685800" y="4400550"/>
+            <a:ext cx="5486400" cy="3600450"/>
+          </a:xfrm>
+          <a:prstGeom prst="rect">
+            <a:avLst/>
+          </a:prstGeom>
+        </p:spPr>
+        <p:txBody>
+          <a:bodyPr vert="horz" lIns="91440" tIns="45720" rIns="91440" bIns="45720" rtlCol="0"/>
+          <a:lstStyle/>
+          <a:p>
+            <a:pPr lvl="0"/>
+            <a:r>
+              <a:rPr lang="en-US"/>
+              <a:t>Edit Master text styles</a:t>
+            </a:r>
+          </a:p>
+          <a:p>
+            <a:pPr lvl="1"/>
+            <a:r>
+              <a:rPr lang="en-US"/>
+              <a:t>Second level</a:t>
+            </a:r>
+          </a:p>
+          <a:p>
+            <a:pPr lvl="2"/>
+            <a:r>
+              <a:rPr lang="en-US"/>
+              <a:t>Third level</a:t>
+            </a:r>
+          </a:p>
+          <a:p>
+            <a:pPr lvl="3"/>
+            <a:r>
+              <a:rPr lang="en-US"/>
+              <a:t>Fourth level</a:t>
+            </a:r>
+          </a:p>
+          <a:p>
+            <a:pPr lvl="4"/>
+            <a:r>
+              <a:rPr lang="en-US"/>
+              <a:t>Fifth level</a:t>
+            </a:r>
+          </a:p>
+        </p:txBody>
+      </p:sp>
+      <p:sp>
+        <p:nvSpPr>
+          <p:cNvPr id="6" name="Footer Placeholder 5"/>
+          <p:cNvSpPr>
+            <a:spLocks noGrp="1"/>
+          </p:cNvSpPr>
+          <p:nvPr>
+            <p:ph type="ftr" sz="quarter" idx="4"/>
+          </p:nvPr>
+        </p:nvSpPr>
+        <p:spPr>
+          <a:xfrm>
+            <a:off x="0" y="8685213"/>
+            <a:ext cx="2971800" cy="458787"/>
+          </a:xfrm>
+          <a:prstGeom prst="rect">
+            <a:avLst/>
+          </a:prstGeom>
+        </p:spPr>
+        <p:txBody>
+          <a:bodyPr vert="horz" lIns="91440" tIns="45720" rIns="91440" bIns="45720" rtlCol="0" anchor="b"/>
+          <a:lstStyle>
+            <a:lvl1pPr algn="l">
+              <a:defRPr sz="1200"/>
+            </a:lvl1pPr>
+          </a:lstStyle>
+          <a:p>
+            <a:endParaRPr lang="en-US"/>
+          </a:p>
+        </p:txBody>
+      </p:sp>
+      <p:sp>
+        <p:nvSpPr>
+          <p:cNvPr id="7" name="Slide Number Placeholder 6"/>
+          <p:cNvSpPr>
+            <a:spLocks noGrp="1"/>
+          </p:cNvSpPr>
+          <p:nvPr>
+            <p:ph type="sldNum" sz="quarter" idx="5"/>
+          </p:nvPr>
+        </p:nvSpPr>
+        <p:spPr>
+          <a:xfrm>
+            <a:off x="3884613" y="8685213"/>
+            <a:ext cx="2971800" cy="458787"/>
+          </a:xfrm>
+          <a:prstGeom prst="rect">
+            <a:avLst/>
+          </a:prstGeom>
+        </p:spPr>
+        <p:txBody>
+          <a:bodyPr vert="horz" lIns="91440" tIns="45720" rIns="91440" bIns="45720" rtlCol="0" anchor="b"/>
+          <a:lstStyle>
+            <a:lvl1pPr algn="r">
+              <a:defRPr sz="1200"/>
+            </a:lvl1pPr>
+          </a:lstStyle>
+          <a:p>
+            <a:fld id="{FA3D834E-32EF-A54C-8810-5A3D71FBD415}" type="slidenum">
+              <a:rPr lang="en-US" smtClean="0"/>
+              <a:t>‹#›</a:t>
+            </a:fld>
+            <a:endParaRPr lang="en-US"/>
+          </a:p>
+        </p:txBody>
+      </p:sp>
+    </p:spTree>
+    <p:extLst>
+      <p:ext uri="{BB962C8B-B14F-4D97-AF65-F5344CB8AC3E}">
+        <p14:creationId xmlns:p14="http://schemas.microsoft.com/office/powerpoint/2010/main" val="2220020264"/>
+      </p:ext>
+    </p:extLst>
+  </p:cSld>
+  <p:clrMap bg1="lt1" tx1="dk1" bg2="lt2" tx2="dk2" accent1="accent1" accent2="accent2" accent3="accent3" accent4="accent4" accent5="accent5" accent6="accent6" hlink="hlink" folHlink="folHlink"/>
+  <p:notesStyle>
+    <a:lvl1pPr marL="0" algn="l" defTabSz="914400" rtl="0" eaLnBrk="1" latinLnBrk="0" hangingPunct="1">
+      <a:defRPr sz="1200" kern="1200">
+        <a:solidFill>
+          <a:schemeClr val="tx1"/>
+        </a:solidFill>
+        <a:latin typeface="+mn-lt"/>
+        <a:ea typeface="+mn-ea"/>
+        <a:cs typeface="+mn-cs"/>
+      </a:defRPr>
+    </a:lvl1pPr>
+    <a:lvl2pPr marL="457200" algn="l" defTabSz="914400" rtl="0" eaLnBrk="1" latinLnBrk="0" hangingPunct="1">
+      <a:defRPr sz="1200" kern="1200">
+        <a:solidFill>
+          <a:schemeClr val="tx1"/>
+        </a:solidFill>
+        <a:latin typeface="+mn-lt"/>
+        <a:ea typeface="+mn-ea"/>
+        <a:cs typeface="+mn-cs"/>
+      </a:defRPr>
+    </a:lvl2pPr>
+    <a:lvl3pPr marL="914400" algn="l" defTabSz="914400" rtl="0" eaLnBrk="1" latinLnBrk="0" hangingPunct="1">
+      <a:defRPr sz="1200" kern="1200">
+        <a:solidFill>
+          <a:schemeClr val="tx1"/>
+        </a:solidFill>
+        <a:latin typeface="+mn-lt"/>
+        <a:ea typeface="+mn-ea"/>
+        <a:cs typeface="+mn-cs"/>
+      </a:defRPr>
+    </a:lvl3pPr>
+    <a:lvl4pPr marL="1371600" algn="l" defTabSz="914400" rtl="0" eaLnBrk="1" latinLnBrk="0" hangingPunct="1">
+      <a:defRPr sz="1200" kern="1200">
+        <a:solidFill>
+          <a:schemeClr val="tx1"/>
+        </a:solidFill>
+        <a:latin typeface="+mn-lt"/>
+        <a:ea typeface="+mn-ea"/>
+        <a:cs typeface="+mn-cs"/>
+      </a:defRPr>
+    </a:lvl4pPr>
+    <a:lvl5pPr marL="1828800" algn="l" defTabSz="914400" rtl="0" eaLnBrk="1" latinLnBrk="0" hangingPunct="1">
+      <a:defRPr sz="1200" kern="1200">
+        <a:solidFill>
+          <a:schemeClr val="tx1"/>
+        </a:solidFill>
+        <a:latin typeface="+mn-lt"/>
+        <a:ea typeface="+mn-ea"/>
+        <a:cs typeface="+mn-cs"/>
+      </a:defRPr>
+    </a:lvl5pPr>
+    <a:lvl6pPr marL="2286000" algn="l" defTabSz="914400" rtl="0" eaLnBrk="1" latinLnBrk="0" hangingPunct="1">
+      <a:defRPr sz="1200" kern="1200">
+        <a:solidFill>
+          <a:schemeClr val="tx1"/>
+        </a:solidFill>
+        <a:latin typeface="+mn-lt"/>
+        <a:ea typeface="+mn-ea"/>
+        <a:cs typeface="+mn-cs"/>
+      </a:defRPr>
+    </a:lvl6pPr>
+    <a:lvl7pPr marL="2743200" algn="l" defTabSz="914400" rtl="0" eaLnBrk="1" latinLnBrk="0" hangingPunct="1">
+      <a:defRPr sz="1200" kern="1200">
+        <a:solidFill>
+          <a:schemeClr val="tx1"/>
+        </a:solidFill>
+        <a:latin typeface="+mn-lt"/>
+        <a:ea typeface="+mn-ea"/>
+        <a:cs typeface="+mn-cs"/>
+      </a:defRPr>
+    </a:lvl7pPr>
+    <a:lvl8pPr marL="3200400" algn="l" defTabSz="914400" rtl="0" eaLnBrk="1" latinLnBrk="0" hangingPunct="1">
+      <a:defRPr sz="1200" kern="1200">
+        <a:solidFill>
+          <a:schemeClr val="tx1"/>
+        </a:solidFill>
+        <a:latin typeface="+mn-lt"/>
+        <a:ea typeface="+mn-ea"/>
+        <a:cs typeface="+mn-cs"/>
+      </a:defRPr>
+    </a:lvl8pPr>
+    <a:lvl9pPr marL="3657600" algn="l" defTabSz="914400" rtl="0" eaLnBrk="1" latinLnBrk="0" hangingPunct="1">
+      <a:defRPr sz="1200" kern="1200">
+        <a:solidFill>
+          <a:schemeClr val="tx1"/>
+        </a:solidFill>
+        <a:latin typeface="+mn-lt"/>
+        <a:ea typeface="+mn-ea"/>
+        <a:cs typeface="+mn-cs"/>
+      </a:defRPr>
+    </a:lvl9pPr>
+  </p:notesStyle>
+</p:notesMaster>
+</file>
+
+<file path=ppt/notesSlides/notesSlide1.xml><?xml version="1.0" encoding="utf-8"?>
+<p:notes xmlns:a="http://schemas.openxmlformats.org/drawingml/2006/main" xmlns:r="http://schemas.openxmlformats.org/officeDocument/2006/relationships" xmlns:p="http://schemas.openxmlformats.org/presentationml/2006/main">
+  <p:cSld>
+    <p:spTree>
+      <p:nvGrpSpPr>
+        <p:cNvPr id="1" name=""/>
+        <p:cNvGrpSpPr/>
+        <p:nvPr/>
+      </p:nvGrpSpPr>
+      <p:grpSpPr>
+        <a:xfrm>
+          <a:off x="0" y="0"/>
+          <a:ext cx="0" cy="0"/>
+          <a:chOff x="0" y="0"/>
+          <a:chExt cx="0" cy="0"/>
+        </a:xfrm>
+      </p:grpSpPr>
+      <p:sp>
+        <p:nvSpPr>
+          <p:cNvPr id="2" name="Slide Image Placeholder 1"/>
+          <p:cNvSpPr>
+            <a:spLocks noGrp="1" noRot="1" noChangeAspect="1"/>
+          </p:cNvSpPr>
+          <p:nvPr>
+            <p:ph type="sldImg"/>
+          </p:nvPr>
+        </p:nvSpPr>
+        <p:spPr/>
+      </p:sp>
+      <p:sp>
+        <p:nvSpPr>
+          <p:cNvPr id="3" name="Notes Placeholder 2"/>
+          <p:cNvSpPr>
+            <a:spLocks noGrp="1"/>
+          </p:cNvSpPr>
+          <p:nvPr>
+            <p:ph type="body" idx="1"/>
+          </p:nvPr>
+        </p:nvSpPr>
+        <p:spPr/>
+        <p:txBody>
+          <a:bodyPr/>
+          <a:lstStyle/>
+          <a:p>
+            <a:r>
+              <a:rPr lang="en-US" dirty="0"/>
+              <a:t>Some of you may not want to </a:t>
+            </a:r>
+          </a:p>
+        </p:txBody>
+      </p:sp>
+      <p:sp>
+        <p:nvSpPr>
+          <p:cNvPr id="4" name="Slide Number Placeholder 3"/>
+          <p:cNvSpPr>
+            <a:spLocks noGrp="1"/>
+          </p:cNvSpPr>
+          <p:nvPr>
+            <p:ph type="sldNum" sz="quarter" idx="5"/>
+          </p:nvPr>
+        </p:nvSpPr>
+        <p:spPr/>
+        <p:txBody>
+          <a:bodyPr/>
+          <a:lstStyle/>
+          <a:p>
+            <a:fld id="{FA3D834E-32EF-A54C-8810-5A3D71FBD415}" type="slidenum">
+              <a:rPr lang="en-US" smtClean="0"/>
+              <a:t>13</a:t>
+            </a:fld>
+            <a:endParaRPr lang="en-US"/>
+          </a:p>
+        </p:txBody>
+      </p:sp>
+    </p:spTree>
+    <p:extLst>
+      <p:ext uri="{BB962C8B-B14F-4D97-AF65-F5344CB8AC3E}">
+        <p14:creationId xmlns:p14="http://schemas.microsoft.com/office/powerpoint/2010/main" val="1701859271"/>
+      </p:ext>
+    </p:extLst>
+  </p:cSld>
+  <p:clrMapOvr>
+    <a:masterClrMapping/>
+  </p:clrMapOvr>
+</p:notes>
 </file>
 
 <file path=ppt/slideLayouts/slideLayout1.xml><?xml version="1.0" encoding="utf-8"?>
@@ -3477,7 +3915,7 @@
           <a:p>
             <a:r>
               <a:rPr lang="en-US" sz="4800" dirty="0"/>
-              <a:t>Collaboration is easy! </a:t>
+              <a:t>Collaboration is easy!(That’s more GitHub, but we’ll get to that later) </a:t>
             </a:r>
           </a:p>
           <a:p>
@@ -3850,7 +4288,7 @@
           <p:cNvPr id="2" name="Title 1">
             <a:extLst>
               <a:ext uri="{FF2B5EF4-FFF2-40B4-BE49-F238E27FC236}">
-                <a16:creationId xmlns:a16="http://schemas.microsoft.com/office/drawing/2014/main" id="{E307D866-2A8E-1F44-A514-23D9169A07A2}"/>
+                <a16:creationId xmlns:a16="http://schemas.microsoft.com/office/drawing/2014/main" id="{695C8B16-1BB4-C243-9E7F-89C5ECE0FE9C}"/>
               </a:ext>
             </a:extLst>
           </p:cNvPr>
@@ -3861,124 +4299,42 @@
             <p:ph type="title"/>
           </p:nvPr>
         </p:nvSpPr>
-        <p:spPr/>
-        <p:txBody>
-          <a:bodyPr/>
-          <a:lstStyle/>
-          <a:p>
-            <a:endParaRPr lang="en-US" dirty="0"/>
-          </a:p>
-        </p:txBody>
-      </p:sp>
-      <p:sp>
-        <p:nvSpPr>
-          <p:cNvPr id="3" name="Content Placeholder 2">
-            <a:extLst>
-              <a:ext uri="{FF2B5EF4-FFF2-40B4-BE49-F238E27FC236}">
-                <a16:creationId xmlns:a16="http://schemas.microsoft.com/office/drawing/2014/main" id="{B71725CF-17C2-1A44-8762-192090EC3A1F}"/>
-              </a:ext>
-            </a:extLst>
-          </p:cNvPr>
-          <p:cNvSpPr>
-            <a:spLocks noGrp="1"/>
-          </p:cNvSpPr>
-          <p:nvPr>
-            <p:ph idx="1"/>
-          </p:nvPr>
-        </p:nvSpPr>
-        <p:spPr/>
-        <p:txBody>
-          <a:bodyPr/>
-          <a:lstStyle/>
-          <a:p>
-            <a:endParaRPr lang="en-US"/>
+        <p:spPr>
+          <a:xfrm>
+            <a:off x="1038225" y="605629"/>
+            <a:ext cx="10148888" cy="6066633"/>
+          </a:xfrm>
+        </p:spPr>
+        <p:txBody>
+          <a:bodyPr>
+            <a:normAutofit/>
+          </a:bodyPr>
+          <a:lstStyle/>
+          <a:p>
+            <a:pPr algn="ctr"/>
+            <a:r>
+              <a:rPr lang="en-US" sz="8000" dirty="0"/>
+              <a:t>NOW LETS DO STUFF</a:t>
+            </a:r>
+            <a:br>
+              <a:rPr lang="en-US" sz="8000" dirty="0"/>
+            </a:br>
+            <a:r>
+              <a:rPr lang="en-US" sz="8000" dirty="0"/>
+              <a:t>(</a:t>
+            </a:r>
+            <a:r>
+              <a:rPr lang="en-US" sz="6000" dirty="0"/>
+              <a:t>Please Be Nice Demo Gods)</a:t>
+            </a:r>
+            <a:endParaRPr lang="en-US" sz="8000" dirty="0"/>
           </a:p>
         </p:txBody>
       </p:sp>
     </p:spTree>
     <p:extLst>
       <p:ext uri="{BB962C8B-B14F-4D97-AF65-F5344CB8AC3E}">
-        <p14:creationId xmlns:p14="http://schemas.microsoft.com/office/powerpoint/2010/main" val="4082988274"/>
-      </p:ext>
-    </p:extLst>
-  </p:cSld>
-  <p:clrMapOvr>
-    <a:masterClrMapping/>
-  </p:clrMapOvr>
-</p:sld>
-</file>
-
-<file path=ppt/slides/slide14.xml><?xml version="1.0" encoding="utf-8"?>
-<p:sld xmlns:a="http://schemas.openxmlformats.org/drawingml/2006/main" xmlns:r="http://schemas.openxmlformats.org/officeDocument/2006/relationships" xmlns:p="http://schemas.openxmlformats.org/presentationml/2006/main">
-  <p:cSld>
-    <p:spTree>
-      <p:nvGrpSpPr>
-        <p:cNvPr id="1" name=""/>
-        <p:cNvGrpSpPr/>
-        <p:nvPr/>
-      </p:nvGrpSpPr>
-      <p:grpSpPr>
-        <a:xfrm>
-          <a:off x="0" y="0"/>
-          <a:ext cx="0" cy="0"/>
-          <a:chOff x="0" y="0"/>
-          <a:chExt cx="0" cy="0"/>
-        </a:xfrm>
-      </p:grpSpPr>
-      <p:sp>
-        <p:nvSpPr>
-          <p:cNvPr id="2" name="Title 1">
-            <a:extLst>
-              <a:ext uri="{FF2B5EF4-FFF2-40B4-BE49-F238E27FC236}">
-                <a16:creationId xmlns:a16="http://schemas.microsoft.com/office/drawing/2014/main" id="{5E9C97D5-150A-7442-92C7-E5AE7D47FCC4}"/>
-              </a:ext>
-            </a:extLst>
-          </p:cNvPr>
-          <p:cNvSpPr>
-            <a:spLocks noGrp="1"/>
-          </p:cNvSpPr>
-          <p:nvPr>
-            <p:ph type="title"/>
-          </p:nvPr>
-        </p:nvSpPr>
-        <p:spPr/>
-        <p:txBody>
-          <a:bodyPr/>
-          <a:lstStyle/>
-          <a:p>
-            <a:endParaRPr lang="en-US" dirty="0"/>
-          </a:p>
-        </p:txBody>
-      </p:sp>
-      <p:sp>
-        <p:nvSpPr>
-          <p:cNvPr id="3" name="Content Placeholder 2">
-            <a:extLst>
-              <a:ext uri="{FF2B5EF4-FFF2-40B4-BE49-F238E27FC236}">
-                <a16:creationId xmlns:a16="http://schemas.microsoft.com/office/drawing/2014/main" id="{F03289EB-5DF4-9140-9B34-8AE576F4F553}"/>
-              </a:ext>
-            </a:extLst>
-          </p:cNvPr>
-          <p:cNvSpPr>
-            <a:spLocks noGrp="1"/>
-          </p:cNvSpPr>
-          <p:nvPr>
-            <p:ph idx="1"/>
-          </p:nvPr>
-        </p:nvSpPr>
-        <p:spPr/>
-        <p:txBody>
-          <a:bodyPr/>
-          <a:lstStyle/>
-          <a:p>
-            <a:endParaRPr lang="en-US"/>
-          </a:p>
-        </p:txBody>
-      </p:sp>
-    </p:spTree>
-    <p:extLst>
-      <p:ext uri="{BB962C8B-B14F-4D97-AF65-F5344CB8AC3E}">
-        <p14:creationId xmlns:p14="http://schemas.microsoft.com/office/powerpoint/2010/main" val="2336429784"/>
+        <p14:creationId xmlns:p14="http://schemas.microsoft.com/office/powerpoint/2010/main" val="4292239086"/>
       </p:ext>
     </p:extLst>
   </p:cSld>
@@ -6036,4 +6392,299 @@
     </a:ext>
   </a:extLst>
 </a:theme>
+</file>
+
+<file path=ppt/theme/theme2.xml><?xml version="1.0" encoding="utf-8"?>
+<a:theme xmlns:a="http://schemas.openxmlformats.org/drawingml/2006/main" name="Office Theme">
+  <a:themeElements>
+    <a:clrScheme name="Office">
+      <a:dk1>
+        <a:sysClr val="windowText" lastClr="000000"/>
+      </a:dk1>
+      <a:lt1>
+        <a:sysClr val="window" lastClr="FFFFFF"/>
+      </a:lt1>
+      <a:dk2>
+        <a:srgbClr val="44546A"/>
+      </a:dk2>
+      <a:lt2>
+        <a:srgbClr val="E7E6E6"/>
+      </a:lt2>
+      <a:accent1>
+        <a:srgbClr val="4472C4"/>
+      </a:accent1>
+      <a:accent2>
+        <a:srgbClr val="ED7D31"/>
+      </a:accent2>
+      <a:accent3>
+        <a:srgbClr val="A5A5A5"/>
+      </a:accent3>
+      <a:accent4>
+        <a:srgbClr val="FFC000"/>
+      </a:accent4>
+      <a:accent5>
+        <a:srgbClr val="5B9BD5"/>
+      </a:accent5>
+      <a:accent6>
+        <a:srgbClr val="70AD47"/>
+      </a:accent6>
+      <a:hlink>
+        <a:srgbClr val="0563C1"/>
+      </a:hlink>
+      <a:folHlink>
+        <a:srgbClr val="954F72"/>
+      </a:folHlink>
+    </a:clrScheme>
+    <a:fontScheme name="Office">
+      <a:majorFont>
+        <a:latin typeface="Calibri Light" panose="020F0302020204030204"/>
+        <a:ea typeface=""/>
+        <a:cs typeface=""/>
+        <a:font script="Jpan" typeface="游ゴシック Light"/>
+        <a:font script="Hang" typeface="맑은 고딕"/>
+        <a:font script="Hans" typeface="等线 Light"/>
+        <a:font script="Hant" typeface="新細明體"/>
+        <a:font script="Arab" typeface="Times New Roman"/>
+        <a:font script="Hebr" typeface="Times New Roman"/>
+        <a:font script="Thai" typeface="Angsana New"/>
+        <a:font script="Ethi" typeface="Nyala"/>
+        <a:font script="Beng" typeface="Vrinda"/>
+        <a:font script="Gujr" typeface="Shruti"/>
+        <a:font script="Khmr" typeface="MoolBoran"/>
+        <a:font script="Knda" typeface="Tunga"/>
+        <a:font script="Guru" typeface="Raavi"/>
+        <a:font script="Cans" typeface="Euphemia"/>
+        <a:font script="Cher" typeface="Plantagenet Cherokee"/>
+        <a:font script="Yiii" typeface="Microsoft Yi Baiti"/>
+        <a:font script="Tibt" typeface="Microsoft Himalaya"/>
+        <a:font script="Thaa" typeface="MV Boli"/>
+        <a:font script="Deva" typeface="Mangal"/>
+        <a:font script="Telu" typeface="Gautami"/>
+        <a:font script="Taml" typeface="Latha"/>
+        <a:font script="Syrc" typeface="Estrangelo Edessa"/>
+        <a:font script="Orya" typeface="Kalinga"/>
+        <a:font script="Mlym" typeface="Kartika"/>
+        <a:font script="Laoo" typeface="DokChampa"/>
+        <a:font script="Sinh" typeface="Iskoola Pota"/>
+        <a:font script="Mong" typeface="Mongolian Baiti"/>
+        <a:font script="Viet" typeface="Times New Roman"/>
+        <a:font script="Uigh" typeface="Microsoft Uighur"/>
+        <a:font script="Geor" typeface="Sylfaen"/>
+        <a:font script="Armn" typeface="Arial"/>
+        <a:font script="Bugi" typeface="Leelawadee UI"/>
+        <a:font script="Bopo" typeface="Microsoft JhengHei"/>
+        <a:font script="Java" typeface="Javanese Text"/>
+        <a:font script="Lisu" typeface="Segoe UI"/>
+        <a:font script="Mymr" typeface="Myanmar Text"/>
+        <a:font script="Nkoo" typeface="Ebrima"/>
+        <a:font script="Olck" typeface="Nirmala UI"/>
+        <a:font script="Osma" typeface="Ebrima"/>
+        <a:font script="Phag" typeface="Phagspa"/>
+        <a:font script="Syrn" typeface="Estrangelo Edessa"/>
+        <a:font script="Syrj" typeface="Estrangelo Edessa"/>
+        <a:font script="Syre" typeface="Estrangelo Edessa"/>
+        <a:font script="Sora" typeface="Nirmala UI"/>
+        <a:font script="Tale" typeface="Microsoft Tai Le"/>
+        <a:font script="Talu" typeface="Microsoft New Tai Lue"/>
+        <a:font script="Tfng" typeface="Ebrima"/>
+      </a:majorFont>
+      <a:minorFont>
+        <a:latin typeface="Calibri" panose="020F0502020204030204"/>
+        <a:ea typeface=""/>
+        <a:cs typeface=""/>
+        <a:font script="Jpan" typeface="游ゴシック"/>
+        <a:font script="Hang" typeface="맑은 고딕"/>
+        <a:font script="Hans" typeface="等线"/>
+        <a:font script="Hant" typeface="新細明體"/>
+        <a:font script="Arab" typeface="Arial"/>
+        <a:font script="Hebr" typeface="Arial"/>
+        <a:font script="Thai" typeface="Cordia New"/>
+        <a:font script="Ethi" typeface="Nyala"/>
+        <a:font script="Beng" typeface="Vrinda"/>
+        <a:font script="Gujr" typeface="Shruti"/>
+        <a:font script="Khmr" typeface="DaunPenh"/>
+        <a:font script="Knda" typeface="Tunga"/>
+        <a:font script="Guru" typeface="Raavi"/>
+        <a:font script="Cans" typeface="Euphemia"/>
+        <a:font script="Cher" typeface="Plantagenet Cherokee"/>
+        <a:font script="Yiii" typeface="Microsoft Yi Baiti"/>
+        <a:font script="Tibt" typeface="Microsoft Himalaya"/>
+        <a:font script="Thaa" typeface="MV Boli"/>
+        <a:font script="Deva" typeface="Mangal"/>
+        <a:font script="Telu" typeface="Gautami"/>
+        <a:font script="Taml" typeface="Latha"/>
+        <a:font script="Syrc" typeface="Estrangelo Edessa"/>
+        <a:font script="Orya" typeface="Kalinga"/>
+        <a:font script="Mlym" typeface="Kartika"/>
+        <a:font script="Laoo" typeface="DokChampa"/>
+        <a:font script="Sinh" typeface="Iskoola Pota"/>
+        <a:font script="Mong" typeface="Mongolian Baiti"/>
+        <a:font script="Viet" typeface="Arial"/>
+        <a:font script="Uigh" typeface="Microsoft Uighur"/>
+        <a:font script="Geor" typeface="Sylfaen"/>
+        <a:font script="Armn" typeface="Arial"/>
+        <a:font script="Bugi" typeface="Leelawadee UI"/>
+        <a:font script="Bopo" typeface="Microsoft JhengHei"/>
+        <a:font script="Java" typeface="Javanese Text"/>
+        <a:font script="Lisu" typeface="Segoe UI"/>
+        <a:font script="Mymr" typeface="Myanmar Text"/>
+        <a:font script="Nkoo" typeface="Ebrima"/>
+        <a:font script="Olck" typeface="Nirmala UI"/>
+        <a:font script="Osma" typeface="Ebrima"/>
+        <a:font script="Phag" typeface="Phagspa"/>
+        <a:font script="Syrn" typeface="Estrangelo Edessa"/>
+        <a:font script="Syrj" typeface="Estrangelo Edessa"/>
+        <a:font script="Syre" typeface="Estrangelo Edessa"/>
+        <a:font script="Sora" typeface="Nirmala UI"/>
+        <a:font script="Tale" typeface="Microsoft Tai Le"/>
+        <a:font script="Talu" typeface="Microsoft New Tai Lue"/>
+        <a:font script="Tfng" typeface="Ebrima"/>
+      </a:minorFont>
+    </a:fontScheme>
+    <a:fmtScheme name="Office">
+      <a:fillStyleLst>
+        <a:solidFill>
+          <a:schemeClr val="phClr"/>
+        </a:solidFill>
+        <a:gradFill rotWithShape="1">
+          <a:gsLst>
+            <a:gs pos="0">
+              <a:schemeClr val="phClr">
+                <a:lumMod val="110000"/>
+                <a:satMod val="105000"/>
+                <a:tint val="67000"/>
+              </a:schemeClr>
+            </a:gs>
+            <a:gs pos="50000">
+              <a:schemeClr val="phClr">
+                <a:lumMod val="105000"/>
+                <a:satMod val="103000"/>
+                <a:tint val="73000"/>
+              </a:schemeClr>
+            </a:gs>
+            <a:gs pos="100000">
+              <a:schemeClr val="phClr">
+                <a:lumMod val="105000"/>
+                <a:satMod val="109000"/>
+                <a:tint val="81000"/>
+              </a:schemeClr>
+            </a:gs>
+          </a:gsLst>
+          <a:lin ang="5400000" scaled="0"/>
+        </a:gradFill>
+        <a:gradFill rotWithShape="1">
+          <a:gsLst>
+            <a:gs pos="0">
+              <a:schemeClr val="phClr">
+                <a:satMod val="103000"/>
+                <a:lumMod val="102000"/>
+                <a:tint val="94000"/>
+              </a:schemeClr>
+            </a:gs>
+            <a:gs pos="50000">
+              <a:schemeClr val="phClr">
+                <a:satMod val="110000"/>
+                <a:lumMod val="100000"/>
+                <a:shade val="100000"/>
+              </a:schemeClr>
+            </a:gs>
+            <a:gs pos="100000">
+              <a:schemeClr val="phClr">
+                <a:lumMod val="99000"/>
+                <a:satMod val="120000"/>
+                <a:shade val="78000"/>
+              </a:schemeClr>
+            </a:gs>
+          </a:gsLst>
+          <a:lin ang="5400000" scaled="0"/>
+        </a:gradFill>
+      </a:fillStyleLst>
+      <a:lnStyleLst>
+        <a:ln w="6350" cap="flat" cmpd="sng" algn="ctr">
+          <a:solidFill>
+            <a:schemeClr val="phClr"/>
+          </a:solidFill>
+          <a:prstDash val="solid"/>
+          <a:miter lim="800000"/>
+        </a:ln>
+        <a:ln w="12700" cap="flat" cmpd="sng" algn="ctr">
+          <a:solidFill>
+            <a:schemeClr val="phClr"/>
+          </a:solidFill>
+          <a:prstDash val="solid"/>
+          <a:miter lim="800000"/>
+        </a:ln>
+        <a:ln w="19050" cap="flat" cmpd="sng" algn="ctr">
+          <a:solidFill>
+            <a:schemeClr val="phClr"/>
+          </a:solidFill>
+          <a:prstDash val="solid"/>
+          <a:miter lim="800000"/>
+        </a:ln>
+      </a:lnStyleLst>
+      <a:effectStyleLst>
+        <a:effectStyle>
+          <a:effectLst/>
+        </a:effectStyle>
+        <a:effectStyle>
+          <a:effectLst/>
+        </a:effectStyle>
+        <a:effectStyle>
+          <a:effectLst>
+            <a:outerShdw blurRad="57150" dist="19050" dir="5400000" algn="ctr" rotWithShape="0">
+              <a:srgbClr val="000000">
+                <a:alpha val="63000"/>
+              </a:srgbClr>
+            </a:outerShdw>
+          </a:effectLst>
+        </a:effectStyle>
+      </a:effectStyleLst>
+      <a:bgFillStyleLst>
+        <a:solidFill>
+          <a:schemeClr val="phClr"/>
+        </a:solidFill>
+        <a:solidFill>
+          <a:schemeClr val="phClr">
+            <a:tint val="95000"/>
+            <a:satMod val="170000"/>
+          </a:schemeClr>
+        </a:solidFill>
+        <a:gradFill rotWithShape="1">
+          <a:gsLst>
+            <a:gs pos="0">
+              <a:schemeClr val="phClr">
+                <a:tint val="93000"/>
+                <a:satMod val="150000"/>
+                <a:shade val="98000"/>
+                <a:lumMod val="102000"/>
+              </a:schemeClr>
+            </a:gs>
+            <a:gs pos="50000">
+              <a:schemeClr val="phClr">
+                <a:tint val="98000"/>
+                <a:satMod val="130000"/>
+                <a:shade val="90000"/>
+                <a:lumMod val="103000"/>
+              </a:schemeClr>
+            </a:gs>
+            <a:gs pos="100000">
+              <a:schemeClr val="phClr">
+                <a:shade val="63000"/>
+                <a:satMod val="120000"/>
+              </a:schemeClr>
+            </a:gs>
+          </a:gsLst>
+          <a:lin ang="5400000" scaled="0"/>
+        </a:gradFill>
+      </a:bgFillStyleLst>
+    </a:fmtScheme>
+  </a:themeElements>
+  <a:objectDefaults/>
+  <a:extraClrSchemeLst/>
+  <a:extLst>
+    <a:ext uri="{05A4C25C-085E-4340-85A3-A5531E510DB2}">
+      <thm15:themeFamily xmlns:thm15="http://schemas.microsoft.com/office/thememl/2012/main" name="Office Theme" id="{62F939B6-93AF-4DB8-9C6B-D6C7DFDC589F}" vid="{4A3C46E8-61CC-4603-A589-7422A47A8E4A}"/>
+    </a:ext>
+  </a:extLst>
+</a:theme>
 </file>
</xml_diff>